<commit_message>
Adds an obstacle in the obstacle scene.
</commit_message>
<xml_diff>
--- a/Flocking.pptx
+++ b/Flocking.pptx
@@ -2,16 +2,20 @@
 <file path=ppt/presentation.xml><?xml version="1.0" encoding="utf-8"?>
 <p:presentation xmlns:a="http://schemas.openxmlformats.org/drawingml/2006/main" xmlns:r="http://schemas.openxmlformats.org/officeDocument/2006/relationships" xmlns:p="http://schemas.openxmlformats.org/presentationml/2006/main" autoCompressPictures="0">
   <p:sldMasterIdLst>
-    <p:sldMasterId id="2147483648" r:id="rId1"/>
+    <p:sldMasterId id="2147483667" r:id="rId1"/>
   </p:sldMasterIdLst>
   <p:sldIdLst>
     <p:sldId id="256" r:id="rId2"/>
     <p:sldId id="257" r:id="rId3"/>
-    <p:sldId id="258" r:id="rId4"/>
-    <p:sldId id="259" r:id="rId5"/>
-    <p:sldId id="260" r:id="rId6"/>
-    <p:sldId id="261" r:id="rId7"/>
-    <p:sldId id="262" r:id="rId8"/>
+    <p:sldId id="263" r:id="rId4"/>
+    <p:sldId id="264" r:id="rId5"/>
+    <p:sldId id="265" r:id="rId6"/>
+    <p:sldId id="258" r:id="rId7"/>
+    <p:sldId id="259" r:id="rId8"/>
+    <p:sldId id="260" r:id="rId9"/>
+    <p:sldId id="261" r:id="rId10"/>
+    <p:sldId id="262" r:id="rId11"/>
+    <p:sldId id="266" r:id="rId12"/>
   </p:sldIdLst>
   <p:sldSz cx="12192000" cy="6858000"/>
   <p:notesSz cx="6858000" cy="9144000"/>
@@ -110,7 +114,35 @@
       </a:defRPr>
     </a:lvl9pPr>
   </p:defaultTextStyle>
+  <p:extLst>
+    <p:ext uri="{521415D9-36F7-43E2-AB2F-B90AF26B5E84}">
+      <p14:sectionLst xmlns:p14="http://schemas.microsoft.com/office/powerpoint/2010/main">
+        <p14:section name="Default Section" id="{AAF0B82D-1967-413E-8223-3C549BBBD661}">
+          <p14:sldIdLst>
+            <p14:sldId id="256"/>
+            <p14:sldId id="257"/>
+            <p14:sldId id="263"/>
+            <p14:sldId id="264"/>
+            <p14:sldId id="265"/>
+            <p14:sldId id="258"/>
+            <p14:sldId id="259"/>
+            <p14:sldId id="260"/>
+            <p14:sldId id="261"/>
+            <p14:sldId id="262"/>
+            <p14:sldId id="266"/>
+          </p14:sldIdLst>
+        </p14:section>
+      </p14:sectionLst>
+    </p:ext>
+    <p:ext uri="{EFAFB233-063F-42B5-8137-9DF3F51BA10A}">
+      <p15:sldGuideLst xmlns:p15="http://schemas.microsoft.com/office/powerpoint/2012/main"/>
+    </p:ext>
+  </p:extLst>
 </p:presentation>
+</file>
+
+<file path=ppt/revisionInfo.xml><?xml version="1.0" encoding="utf-8"?>
+<p1510:revInfo xmlns:a="http://schemas.openxmlformats.org/drawingml/2006/main" xmlns:r="http://schemas.openxmlformats.org/officeDocument/2006/relationships" xmlns:p1510="http://schemas.microsoft.com/office/powerpoint/2015/10/main"/>
 </file>
 
 <file path=ppt/slideLayouts/slideLayout1.xml><?xml version="1.0" encoding="utf-8"?>
@@ -399,9 +431,9 @@
           <a:lstStyle/>
           <a:p>
             <a:fld id="{08B9EBBA-996F-894A-B54A-D6246ED52CEA}" type="datetimeFigureOut">
-              <a:rPr lang="en-US" dirty="0"/>
+              <a:rPr lang="en-US" smtClean="0"/>
               <a:pPr/>
-              <a:t>5/13/2017</a:t>
+              <a:t>5/16/2017</a:t>
             </a:fld>
             <a:endParaRPr lang="en-US" dirty="0"/>
           </a:p>
@@ -442,7 +474,7 @@
           <a:lstStyle/>
           <a:p>
             <a:fld id="{D57F1E4F-1CFF-5643-939E-217C01CDF565}" type="slidenum">
-              <a:rPr lang="en-US" dirty="0"/>
+              <a:rPr lang="en-US" smtClean="0"/>
               <a:pPr/>
               <a:t>‹#›</a:t>
             </a:fld>
@@ -451,6 +483,11 @@
         </p:txBody>
       </p:sp>
     </p:spTree>
+    <p:extLst>
+      <p:ext uri="{BB962C8B-B14F-4D97-AF65-F5344CB8AC3E}">
+        <p14:creationId xmlns:p14="http://schemas.microsoft.com/office/powerpoint/2010/main" val="2810189775"/>
+      </p:ext>
+    </p:extLst>
   </p:cSld>
   <p:clrMapOvr>
     <a:masterClrMapping/>
@@ -714,9 +751,9 @@
           <a:lstStyle/>
           <a:p>
             <a:fld id="{18C79C5D-2A6F-F04D-97DA-BEF2467B64E4}" type="datetimeFigureOut">
-              <a:rPr lang="en-US" dirty="0"/>
+              <a:rPr lang="en-US" smtClean="0"/>
               <a:pPr/>
-              <a:t>5/13/2017</a:t>
+              <a:t>5/16/2017</a:t>
             </a:fld>
             <a:endParaRPr lang="en-US" dirty="0"/>
           </a:p>
@@ -757,7 +794,7 @@
           <a:lstStyle/>
           <a:p>
             <a:fld id="{D57F1E4F-1CFF-5643-939E-217C01CDF565}" type="slidenum">
-              <a:rPr lang="en-US" dirty="0"/>
+              <a:rPr lang="en-US" smtClean="0"/>
               <a:pPr/>
               <a:t>‹#›</a:t>
             </a:fld>
@@ -766,6 +803,11 @@
         </p:txBody>
       </p:sp>
     </p:spTree>
+    <p:extLst>
+      <p:ext uri="{BB962C8B-B14F-4D97-AF65-F5344CB8AC3E}">
+        <p14:creationId xmlns:p14="http://schemas.microsoft.com/office/powerpoint/2010/main" val="3064952569"/>
+      </p:ext>
+    </p:extLst>
   </p:cSld>
   <p:clrMapOvr>
     <a:masterClrMapping/>
@@ -1199,9 +1241,9 @@
           <a:lstStyle/>
           <a:p>
             <a:fld id="{8DFA1846-DA80-1C48-A609-854EA85C59AD}" type="datetimeFigureOut">
-              <a:rPr lang="en-US" dirty="0"/>
+              <a:rPr lang="en-US" smtClean="0"/>
               <a:pPr/>
-              <a:t>5/13/2017</a:t>
+              <a:t>5/16/2017</a:t>
             </a:fld>
             <a:endParaRPr lang="en-US" dirty="0"/>
           </a:p>
@@ -1242,7 +1284,7 @@
           <a:lstStyle/>
           <a:p>
             <a:fld id="{D57F1E4F-1CFF-5643-939E-217C01CDF565}" type="slidenum">
-              <a:rPr lang="en-US" dirty="0"/>
+              <a:rPr lang="en-US" smtClean="0"/>
               <a:pPr/>
               <a:t>‹#›</a:t>
             </a:fld>
@@ -1251,6 +1293,11 @@
         </p:txBody>
       </p:sp>
     </p:spTree>
+    <p:extLst>
+      <p:ext uri="{BB962C8B-B14F-4D97-AF65-F5344CB8AC3E}">
+        <p14:creationId xmlns:p14="http://schemas.microsoft.com/office/powerpoint/2010/main" val="3532364214"/>
+      </p:ext>
+    </p:extLst>
   </p:cSld>
   <p:clrMapOvr>
     <a:masterClrMapping/>
@@ -1565,9 +1612,9 @@
           <a:lstStyle/>
           <a:p>
             <a:fld id="{FBF54567-0DE4-3F47-BF90-CB84690072F9}" type="datetimeFigureOut">
-              <a:rPr lang="en-US" dirty="0"/>
+              <a:rPr lang="en-US" smtClean="0"/>
               <a:pPr/>
-              <a:t>5/13/2017</a:t>
+              <a:t>5/16/2017</a:t>
             </a:fld>
             <a:endParaRPr lang="en-US" dirty="0"/>
           </a:p>
@@ -1608,7 +1655,7 @@
           <a:lstStyle/>
           <a:p>
             <a:fld id="{D57F1E4F-1CFF-5643-939E-217C01CDF565}" type="slidenum">
-              <a:rPr lang="en-US" dirty="0"/>
+              <a:rPr lang="en-US" smtClean="0"/>
               <a:pPr/>
               <a:t>‹#›</a:t>
             </a:fld>
@@ -1617,6 +1664,11 @@
         </p:txBody>
       </p:sp>
     </p:spTree>
+    <p:extLst>
+      <p:ext uri="{BB962C8B-B14F-4D97-AF65-F5344CB8AC3E}">
+        <p14:creationId xmlns:p14="http://schemas.microsoft.com/office/powerpoint/2010/main" val="958132112"/>
+      </p:ext>
+    </p:extLst>
   </p:cSld>
   <p:clrMapOvr>
     <a:masterClrMapping/>
@@ -1835,9 +1887,9 @@
           <a:lstStyle/>
           <a:p>
             <a:fld id="{C6C52C72-DE31-F449-A4ED-4C594FD91407}" type="datetimeFigureOut">
-              <a:rPr lang="en-US" dirty="0"/>
+              <a:rPr lang="en-US" smtClean="0"/>
               <a:pPr/>
-              <a:t>5/13/2017</a:t>
+              <a:t>5/16/2017</a:t>
             </a:fld>
             <a:endParaRPr lang="en-US" dirty="0"/>
           </a:p>
@@ -1878,7 +1930,7 @@
           <a:lstStyle/>
           <a:p>
             <a:fld id="{D57F1E4F-1CFF-5643-939E-217C01CDF565}" type="slidenum">
-              <a:rPr lang="en-US" dirty="0"/>
+              <a:rPr lang="en-US" smtClean="0"/>
               <a:pPr/>
               <a:t>‹#›</a:t>
             </a:fld>
@@ -1887,6 +1939,11 @@
         </p:txBody>
       </p:sp>
     </p:spTree>
+    <p:extLst>
+      <p:ext uri="{BB962C8B-B14F-4D97-AF65-F5344CB8AC3E}">
+        <p14:creationId xmlns:p14="http://schemas.microsoft.com/office/powerpoint/2010/main" val="3585925687"/>
+      </p:ext>
+    </p:extLst>
   </p:cSld>
   <p:clrMapOvr>
     <a:masterClrMapping/>
@@ -2117,9 +2174,9 @@
           <a:lstStyle/>
           <a:p>
             <a:fld id="{ED62726E-379B-B349-9EED-81ED093FA806}" type="datetimeFigureOut">
-              <a:rPr lang="en-US" dirty="0"/>
+              <a:rPr lang="en-US" smtClean="0"/>
               <a:pPr/>
-              <a:t>5/13/2017</a:t>
+              <a:t>5/16/2017</a:t>
             </a:fld>
             <a:endParaRPr lang="en-US" dirty="0"/>
           </a:p>
@@ -2160,7 +2217,7 @@
           <a:lstStyle/>
           <a:p>
             <a:fld id="{D57F1E4F-1CFF-5643-939E-217C01CDF565}" type="slidenum">
-              <a:rPr lang="en-US" dirty="0"/>
+              <a:rPr lang="en-US" smtClean="0"/>
               <a:pPr/>
               <a:t>‹#›</a:t>
             </a:fld>
@@ -2169,6 +2226,11 @@
         </p:txBody>
       </p:sp>
     </p:spTree>
+    <p:extLst>
+      <p:ext uri="{BB962C8B-B14F-4D97-AF65-F5344CB8AC3E}">
+        <p14:creationId xmlns:p14="http://schemas.microsoft.com/office/powerpoint/2010/main" val="1508859117"/>
+      </p:ext>
+    </p:extLst>
   </p:cSld>
   <p:clrMapOvr>
     <a:masterClrMapping/>
@@ -2397,9 +2459,9 @@
           <a:lstStyle/>
           <a:p>
             <a:fld id="{9B3A1323-8D79-1946-B0D7-40001CF92E9D}" type="datetimeFigureOut">
-              <a:rPr lang="en-US" dirty="0"/>
+              <a:rPr lang="en-US" smtClean="0"/>
               <a:pPr/>
-              <a:t>5/13/2017</a:t>
+              <a:t>5/16/2017</a:t>
             </a:fld>
             <a:endParaRPr lang="en-US" dirty="0"/>
           </a:p>
@@ -2440,7 +2502,7 @@
           <a:lstStyle/>
           <a:p>
             <a:fld id="{D57F1E4F-1CFF-5643-939E-217C01CDF565}" type="slidenum">
-              <a:rPr lang="en-US" dirty="0"/>
+              <a:rPr lang="en-US" smtClean="0"/>
               <a:pPr/>
               <a:t>‹#›</a:t>
             </a:fld>
@@ -2449,6 +2511,11 @@
         </p:txBody>
       </p:sp>
     </p:spTree>
+    <p:extLst>
+      <p:ext uri="{BB962C8B-B14F-4D97-AF65-F5344CB8AC3E}">
+        <p14:creationId xmlns:p14="http://schemas.microsoft.com/office/powerpoint/2010/main" val="1846835982"/>
+      </p:ext>
+    </p:extLst>
   </p:cSld>
   <p:clrMapOvr>
     <a:masterClrMapping/>
@@ -2737,9 +2804,9 @@
           <a:lstStyle/>
           <a:p>
             <a:fld id="{8DFA1846-DA80-1C48-A609-854EA85C59AD}" type="datetimeFigureOut">
-              <a:rPr lang="en-US" dirty="0"/>
+              <a:rPr lang="en-US" smtClean="0"/>
               <a:pPr/>
-              <a:t>5/13/2017</a:t>
+              <a:t>5/16/2017</a:t>
             </a:fld>
             <a:endParaRPr lang="en-US" dirty="0"/>
           </a:p>
@@ -2780,7 +2847,7 @@
           <a:lstStyle/>
           <a:p>
             <a:fld id="{D57F1E4F-1CFF-5643-939E-217C01CDF565}" type="slidenum">
-              <a:rPr lang="en-US" dirty="0"/>
+              <a:rPr lang="en-US" smtClean="0"/>
               <a:pPr/>
               <a:t>‹#›</a:t>
             </a:fld>
@@ -2789,6 +2856,11 @@
         </p:txBody>
       </p:sp>
     </p:spTree>
+    <p:extLst>
+      <p:ext uri="{BB962C8B-B14F-4D97-AF65-F5344CB8AC3E}">
+        <p14:creationId xmlns:p14="http://schemas.microsoft.com/office/powerpoint/2010/main" val="2574820561"/>
+      </p:ext>
+    </p:extLst>
   </p:cSld>
   <p:clrMapOvr>
     <a:masterClrMapping/>
@@ -3073,9 +3145,9 @@
           <a:lstStyle/>
           <a:p>
             <a:fld id="{57302355-E14B-8545-A8F8-0FE83CC9D524}" type="datetimeFigureOut">
-              <a:rPr lang="en-US" dirty="0"/>
+              <a:rPr lang="en-US" smtClean="0"/>
               <a:pPr/>
-              <a:t>5/13/2017</a:t>
+              <a:t>5/16/2017</a:t>
             </a:fld>
             <a:endParaRPr lang="en-US" dirty="0"/>
           </a:p>
@@ -3116,7 +3188,7 @@
           <a:lstStyle/>
           <a:p>
             <a:fld id="{D57F1E4F-1CFF-5643-939E-217C01CDF565}" type="slidenum">
-              <a:rPr lang="en-US" dirty="0"/>
+              <a:rPr lang="en-US" smtClean="0"/>
               <a:pPr/>
               <a:t>‹#›</a:t>
             </a:fld>
@@ -3125,6 +3197,11 @@
         </p:txBody>
       </p:sp>
     </p:spTree>
+    <p:extLst>
+      <p:ext uri="{BB962C8B-B14F-4D97-AF65-F5344CB8AC3E}">
+        <p14:creationId xmlns:p14="http://schemas.microsoft.com/office/powerpoint/2010/main" val="3361911221"/>
+      </p:ext>
+    </p:extLst>
   </p:cSld>
   <p:clrMapOvr>
     <a:masterClrMapping/>
@@ -3547,9 +3624,9 @@
           <a:lstStyle/>
           <a:p>
             <a:fld id="{02640F58-564D-2B4F-AE67-E407BA4FCF45}" type="datetimeFigureOut">
-              <a:rPr lang="en-US" dirty="0"/>
+              <a:rPr lang="en-US" smtClean="0"/>
               <a:pPr/>
-              <a:t>5/13/2017</a:t>
+              <a:t>5/16/2017</a:t>
             </a:fld>
             <a:endParaRPr lang="en-US" dirty="0"/>
           </a:p>
@@ -3590,7 +3667,7 @@
           <a:lstStyle/>
           <a:p>
             <a:fld id="{D57F1E4F-1CFF-5643-939E-217C01CDF565}" type="slidenum">
-              <a:rPr lang="en-US" dirty="0"/>
+              <a:rPr lang="en-US" smtClean="0"/>
               <a:pPr/>
               <a:t>‹#›</a:t>
             </a:fld>
@@ -3599,6 +3676,11 @@
         </p:txBody>
       </p:sp>
     </p:spTree>
+    <p:extLst>
+      <p:ext uri="{BB962C8B-B14F-4D97-AF65-F5344CB8AC3E}">
+        <p14:creationId xmlns:p14="http://schemas.microsoft.com/office/powerpoint/2010/main" val="1370830056"/>
+      </p:ext>
+    </p:extLst>
   </p:cSld>
   <p:clrMapOvr>
     <a:masterClrMapping/>
@@ -3765,9 +3847,9 @@
           <a:lstStyle/>
           <a:p>
             <a:fld id="{F13A34C8-038E-2045-AF43-DF7DBB8E0E9E}" type="datetimeFigureOut">
-              <a:rPr lang="en-US" dirty="0"/>
+              <a:rPr lang="en-US" smtClean="0"/>
               <a:pPr/>
-              <a:t>5/13/2017</a:t>
+              <a:t>5/16/2017</a:t>
             </a:fld>
             <a:endParaRPr lang="en-US" dirty="0"/>
           </a:p>
@@ -3808,7 +3890,7 @@
           <a:lstStyle/>
           <a:p>
             <a:fld id="{D57F1E4F-1CFF-5643-939E-217C01CDF565}" type="slidenum">
-              <a:rPr lang="en-US" dirty="0"/>
+              <a:rPr lang="en-US" smtClean="0"/>
               <a:pPr/>
               <a:t>‹#›</a:t>
             </a:fld>
@@ -3817,6 +3899,11 @@
         </p:txBody>
       </p:sp>
     </p:spTree>
+    <p:extLst>
+      <p:ext uri="{BB962C8B-B14F-4D97-AF65-F5344CB8AC3E}">
+        <p14:creationId xmlns:p14="http://schemas.microsoft.com/office/powerpoint/2010/main" val="1868194830"/>
+      </p:ext>
+    </p:extLst>
   </p:cSld>
   <p:clrMapOvr>
     <a:masterClrMapping/>
@@ -3857,9 +3944,9 @@
           <a:lstStyle/>
           <a:p>
             <a:fld id="{8818C68F-D26B-8F47-958C-23B49CF8A634}" type="datetimeFigureOut">
-              <a:rPr lang="en-US" dirty="0"/>
+              <a:rPr lang="en-US" smtClean="0"/>
               <a:pPr/>
-              <a:t>5/13/2017</a:t>
+              <a:t>5/16/2017</a:t>
             </a:fld>
             <a:endParaRPr lang="en-US" dirty="0"/>
           </a:p>
@@ -3900,7 +3987,7 @@
           <a:lstStyle/>
           <a:p>
             <a:fld id="{D57F1E4F-1CFF-5643-939E-217C01CDF565}" type="slidenum">
-              <a:rPr lang="en-US" dirty="0"/>
+              <a:rPr lang="en-US" smtClean="0"/>
               <a:pPr/>
               <a:t>‹#›</a:t>
             </a:fld>
@@ -3909,6 +3996,11 @@
         </p:txBody>
       </p:sp>
     </p:spTree>
+    <p:extLst>
+      <p:ext uri="{BB962C8B-B14F-4D97-AF65-F5344CB8AC3E}">
+        <p14:creationId xmlns:p14="http://schemas.microsoft.com/office/powerpoint/2010/main" val="3398919764"/>
+      </p:ext>
+    </p:extLst>
   </p:cSld>
   <p:clrMapOvr>
     <a:masterClrMapping/>
@@ -4321,9 +4413,9 @@
           <a:lstStyle/>
           <a:p>
             <a:fld id="{D0DF5E60-9974-AC48-9591-99C2BB44B7CF}" type="datetimeFigureOut">
-              <a:rPr lang="en-US" dirty="0"/>
+              <a:rPr lang="en-US" smtClean="0"/>
               <a:pPr/>
-              <a:t>5/13/2017</a:t>
+              <a:t>5/16/2017</a:t>
             </a:fld>
             <a:endParaRPr lang="en-US" dirty="0"/>
           </a:p>
@@ -4364,7 +4456,7 @@
           <a:lstStyle/>
           <a:p>
             <a:fld id="{D57F1E4F-1CFF-5643-939E-217C01CDF565}" type="slidenum">
-              <a:rPr lang="en-US" dirty="0"/>
+              <a:rPr lang="en-US" smtClean="0"/>
               <a:pPr/>
               <a:t>‹#›</a:t>
             </a:fld>
@@ -4373,6 +4465,11 @@
         </p:txBody>
       </p:sp>
     </p:spTree>
+    <p:extLst>
+      <p:ext uri="{BB962C8B-B14F-4D97-AF65-F5344CB8AC3E}">
+        <p14:creationId xmlns:p14="http://schemas.microsoft.com/office/powerpoint/2010/main" val="3540384783"/>
+      </p:ext>
+    </p:extLst>
   </p:cSld>
   <p:clrMapOvr>
     <a:masterClrMapping/>
@@ -4631,9 +4728,9 @@
           <a:lstStyle/>
           <a:p>
             <a:fld id="{18C79C5D-2A6F-F04D-97DA-BEF2467B64E4}" type="datetimeFigureOut">
-              <a:rPr lang="en-US" dirty="0"/>
+              <a:rPr lang="en-US" smtClean="0"/>
               <a:pPr/>
-              <a:t>5/13/2017</a:t>
+              <a:t>5/16/2017</a:t>
             </a:fld>
             <a:endParaRPr lang="en-US" dirty="0"/>
           </a:p>
@@ -4684,7 +4781,7 @@
           <a:lstStyle/>
           <a:p>
             <a:fld id="{D57F1E4F-1CFF-5643-939E-217C01CDF565}" type="slidenum">
-              <a:rPr lang="en-US" dirty="0"/>
+              <a:rPr lang="en-US" smtClean="0"/>
               <a:pPr/>
               <a:t>‹#›</a:t>
             </a:fld>
@@ -4693,6 +4790,11 @@
         </p:txBody>
       </p:sp>
     </p:spTree>
+    <p:extLst>
+      <p:ext uri="{BB962C8B-B14F-4D97-AF65-F5344CB8AC3E}">
+        <p14:creationId xmlns:p14="http://schemas.microsoft.com/office/powerpoint/2010/main" val="585544559"/>
+      </p:ext>
+    </p:extLst>
   </p:cSld>
   <p:clrMapOvr>
     <a:masterClrMapping/>
@@ -4898,9 +5000,9 @@
           </a:lstStyle>
           <a:p>
             <a:fld id="{09B482E8-6E0E-1B4F-B1FD-C69DB9E858D9}" type="datetimeFigureOut">
-              <a:rPr lang="en-US" dirty="0"/>
+              <a:rPr lang="en-US" smtClean="0"/>
               <a:pPr/>
-              <a:t>5/13/2017</a:t>
+              <a:t>5/16/2017</a:t>
             </a:fld>
             <a:endParaRPr lang="en-US" dirty="0"/>
           </a:p>
@@ -4938,7 +5040,7 @@
           </a:lstStyle>
           <a:p>
             <a:fld id="{D57F1E4F-1CFF-5643-939E-217C01CDF565}" type="slidenum">
-              <a:rPr lang="en-US" dirty="0"/>
+              <a:rPr lang="en-US" smtClean="0"/>
               <a:pPr/>
               <a:t>‹#›</a:t>
             </a:fld>
@@ -4947,23 +5049,28 @@
         </p:txBody>
       </p:sp>
     </p:spTree>
+    <p:extLst>
+      <p:ext uri="{BB962C8B-B14F-4D97-AF65-F5344CB8AC3E}">
+        <p14:creationId xmlns:p14="http://schemas.microsoft.com/office/powerpoint/2010/main" val="3603543043"/>
+      </p:ext>
+    </p:extLst>
   </p:cSld>
   <p:clrMap bg1="dk1" tx1="lt1" bg2="dk2" tx2="lt2" accent1="accent1" accent2="accent2" accent3="accent3" accent4="accent4" accent5="accent5" accent6="accent6" hlink="hlink" folHlink="folHlink"/>
   <p:sldLayoutIdLst>
-    <p:sldLayoutId id="2147483649" r:id="rId1"/>
-    <p:sldLayoutId id="2147483650" r:id="rId2"/>
-    <p:sldLayoutId id="2147483651" r:id="rId3"/>
-    <p:sldLayoutId id="2147483652" r:id="rId4"/>
-    <p:sldLayoutId id="2147483653" r:id="rId5"/>
-    <p:sldLayoutId id="2147483654" r:id="rId6"/>
-    <p:sldLayoutId id="2147483655" r:id="rId7"/>
-    <p:sldLayoutId id="2147483656" r:id="rId8"/>
-    <p:sldLayoutId id="2147483663" r:id="rId9"/>
-    <p:sldLayoutId id="2147483657" r:id="rId10"/>
-    <p:sldLayoutId id="2147483666" r:id="rId11"/>
-    <p:sldLayoutId id="2147483661" r:id="rId12"/>
-    <p:sldLayoutId id="2147483658" r:id="rId13"/>
-    <p:sldLayoutId id="2147483659" r:id="rId14"/>
+    <p:sldLayoutId id="2147483668" r:id="rId1"/>
+    <p:sldLayoutId id="2147483669" r:id="rId2"/>
+    <p:sldLayoutId id="2147483670" r:id="rId3"/>
+    <p:sldLayoutId id="2147483671" r:id="rId4"/>
+    <p:sldLayoutId id="2147483672" r:id="rId5"/>
+    <p:sldLayoutId id="2147483673" r:id="rId6"/>
+    <p:sldLayoutId id="2147483674" r:id="rId7"/>
+    <p:sldLayoutId id="2147483675" r:id="rId8"/>
+    <p:sldLayoutId id="2147483676" r:id="rId9"/>
+    <p:sldLayoutId id="2147483677" r:id="rId10"/>
+    <p:sldLayoutId id="2147483678" r:id="rId11"/>
+    <p:sldLayoutId id="2147483679" r:id="rId12"/>
+    <p:sldLayoutId id="2147483680" r:id="rId13"/>
+    <p:sldLayoutId id="2147483681" r:id="rId14"/>
   </p:sldLayoutIdLst>
   <p:hf sldNum="0" hdr="0" ftr="0" dt="0"/>
   <p:txStyles>
@@ -5403,6 +5510,203 @@
 </p:sld>
 </file>
 
+<file path=ppt/slides/slide10.xml><?xml version="1.0" encoding="utf-8"?>
+<p:sld xmlns:a="http://schemas.openxmlformats.org/drawingml/2006/main" xmlns:r="http://schemas.openxmlformats.org/officeDocument/2006/relationships" xmlns:p="http://schemas.openxmlformats.org/presentationml/2006/main">
+  <p:cSld>
+    <p:spTree>
+      <p:nvGrpSpPr>
+        <p:cNvPr id="1" name=""/>
+        <p:cNvGrpSpPr/>
+        <p:nvPr/>
+      </p:nvGrpSpPr>
+      <p:grpSpPr>
+        <a:xfrm>
+          <a:off x="0" y="0"/>
+          <a:ext cx="0" cy="0"/>
+          <a:chOff x="0" y="0"/>
+          <a:chExt cx="0" cy="0"/>
+        </a:xfrm>
+      </p:grpSpPr>
+      <p:sp>
+        <p:nvSpPr>
+          <p:cNvPr id="2" name="Title 1"/>
+          <p:cNvSpPr>
+            <a:spLocks noGrp="1"/>
+          </p:cNvSpPr>
+          <p:nvPr>
+            <p:ph type="title"/>
+          </p:nvPr>
+        </p:nvSpPr>
+        <p:spPr/>
+        <p:txBody>
+          <a:bodyPr/>
+          <a:lstStyle/>
+          <a:p>
+            <a:r>
+              <a:rPr lang="en-US" dirty="0"/>
+              <a:t>Other Metrics Related to Velocity</a:t>
+            </a:r>
+          </a:p>
+        </p:txBody>
+      </p:sp>
+      <p:sp>
+        <p:nvSpPr>
+          <p:cNvPr id="3" name="Content Placeholder 2"/>
+          <p:cNvSpPr>
+            <a:spLocks noGrp="1"/>
+          </p:cNvSpPr>
+          <p:nvPr>
+            <p:ph idx="1"/>
+          </p:nvPr>
+        </p:nvSpPr>
+        <p:spPr/>
+        <p:txBody>
+          <a:bodyPr/>
+          <a:lstStyle/>
+          <a:p>
+            <a:r>
+              <a:rPr lang="en-US" dirty="0"/>
+              <a:t>Recap of questions:</a:t>
+            </a:r>
+          </a:p>
+          <a:p>
+            <a:pPr lvl="1"/>
+            <a:r>
+              <a:rPr lang="en-US" dirty="0"/>
+              <a:t>How do other organisms perceive velocity/speed?</a:t>
+            </a:r>
+          </a:p>
+          <a:p>
+            <a:pPr lvl="1"/>
+            <a:r>
+              <a:rPr lang="en-US" dirty="0"/>
+              <a:t>Velocity – is it a human construct?</a:t>
+            </a:r>
+          </a:p>
+          <a:p>
+            <a:r>
+              <a:rPr lang="en-US" dirty="0"/>
+              <a:t>Consider how we can possibly give directions in the city</a:t>
+            </a:r>
+          </a:p>
+          <a:p>
+            <a:pPr lvl="1"/>
+            <a:r>
+              <a:rPr lang="en-US" dirty="0"/>
+              <a:t>Use blocks</a:t>
+            </a:r>
+          </a:p>
+          <a:p>
+            <a:pPr lvl="1"/>
+            <a:r>
+              <a:rPr lang="en-US" dirty="0"/>
+              <a:t>Use time and point a direction</a:t>
+            </a:r>
+          </a:p>
+          <a:p>
+            <a:endParaRPr lang="en-US" dirty="0"/>
+          </a:p>
+        </p:txBody>
+      </p:sp>
+    </p:spTree>
+    <p:extLst>
+      <p:ext uri="{BB962C8B-B14F-4D97-AF65-F5344CB8AC3E}">
+        <p14:creationId xmlns:p14="http://schemas.microsoft.com/office/powerpoint/2010/main" val="2618662776"/>
+      </p:ext>
+    </p:extLst>
+  </p:cSld>
+  <p:clrMapOvr>
+    <a:masterClrMapping/>
+  </p:clrMapOvr>
+</p:sld>
+</file>
+
+<file path=ppt/slides/slide11.xml><?xml version="1.0" encoding="utf-8"?>
+<p:sld xmlns:a="http://schemas.openxmlformats.org/drawingml/2006/main" xmlns:r="http://schemas.openxmlformats.org/officeDocument/2006/relationships" xmlns:p="http://schemas.openxmlformats.org/presentationml/2006/main">
+  <p:cSld>
+    <p:spTree>
+      <p:nvGrpSpPr>
+        <p:cNvPr id="1" name=""/>
+        <p:cNvGrpSpPr/>
+        <p:nvPr/>
+      </p:nvGrpSpPr>
+      <p:grpSpPr>
+        <a:xfrm>
+          <a:off x="0" y="0"/>
+          <a:ext cx="0" cy="0"/>
+          <a:chOff x="0" y="0"/>
+          <a:chExt cx="0" cy="0"/>
+        </a:xfrm>
+      </p:grpSpPr>
+      <p:sp>
+        <p:nvSpPr>
+          <p:cNvPr id="2" name="Title 1"/>
+          <p:cNvSpPr>
+            <a:spLocks noGrp="1"/>
+          </p:cNvSpPr>
+          <p:nvPr>
+            <p:ph type="title"/>
+          </p:nvPr>
+        </p:nvSpPr>
+        <p:spPr/>
+        <p:txBody>
+          <a:bodyPr/>
+          <a:lstStyle/>
+          <a:p>
+            <a:r>
+              <a:rPr lang="en-US" dirty="0"/>
+              <a:t>Flocking in Robotics</a:t>
+            </a:r>
+          </a:p>
+        </p:txBody>
+      </p:sp>
+      <p:sp>
+        <p:nvSpPr>
+          <p:cNvPr id="3" name="Content Placeholder 2"/>
+          <p:cNvSpPr>
+            <a:spLocks noGrp="1"/>
+          </p:cNvSpPr>
+          <p:nvPr>
+            <p:ph idx="1"/>
+          </p:nvPr>
+        </p:nvSpPr>
+        <p:spPr/>
+        <p:txBody>
+          <a:bodyPr/>
+          <a:lstStyle/>
+          <a:p>
+            <a:r>
+              <a:rPr lang="en-US" dirty="0"/>
+              <a:t>Use infrared sensors, audio sensors, and GPS to determine position of itself</a:t>
+            </a:r>
+          </a:p>
+          <a:p>
+            <a:r>
+              <a:rPr lang="en-US" dirty="0"/>
+              <a:t>Uses force of attraction and repulsion to determine offset</a:t>
+            </a:r>
+          </a:p>
+          <a:p>
+            <a:r>
+              <a:rPr lang="en-US" dirty="0"/>
+              <a:t>Used in search and recue robots </a:t>
+            </a:r>
+          </a:p>
+        </p:txBody>
+      </p:sp>
+    </p:spTree>
+    <p:extLst>
+      <p:ext uri="{BB962C8B-B14F-4D97-AF65-F5344CB8AC3E}">
+        <p14:creationId xmlns:p14="http://schemas.microsoft.com/office/powerpoint/2010/main" val="726265620"/>
+      </p:ext>
+    </p:extLst>
+  </p:cSld>
+  <p:clrMapOvr>
+    <a:masterClrMapping/>
+  </p:clrMapOvr>
+</p:sld>
+</file>
+
 <file path=ppt/slides/slide2.xml><?xml version="1.0" encoding="utf-8"?>
 <p:sld xmlns:a="http://schemas.openxmlformats.org/drawingml/2006/main" xmlns:r="http://schemas.openxmlformats.org/officeDocument/2006/relationships" xmlns:p="http://schemas.openxmlformats.org/presentationml/2006/main">
   <p:cSld>
@@ -5471,7 +5775,7 @@
           <a:p>
             <a:r>
               <a:rPr lang="en-US" dirty="0"/>
-              <a:t>Shows spatial awareness</a:t>
+              <a:t>Shows spatial awareness amongst organisms</a:t>
             </a:r>
           </a:p>
         </p:txBody>
@@ -5523,7 +5827,7 @@
           <a:p>
             <a:r>
               <a:rPr lang="en-US" dirty="0"/>
-              <a:t>Rules of Flocking</a:t>
+              <a:t>Questions for Flocking</a:t>
             </a:r>
           </a:p>
         </p:txBody>
@@ -5538,49 +5842,103 @@
             <p:ph idx="1"/>
           </p:nvPr>
         </p:nvSpPr>
-        <p:spPr/>
+        <p:spPr>
+          <a:xfrm>
+            <a:off x="516708" y="2465568"/>
+            <a:ext cx="10554574" cy="3636511"/>
+          </a:xfrm>
+        </p:spPr>
         <p:txBody>
           <a:bodyPr/>
           <a:lstStyle/>
           <a:p>
             <a:r>
               <a:rPr lang="en-US" dirty="0"/>
-              <a:t>Three basic rules for flocking</a:t>
-            </a:r>
-          </a:p>
-          <a:p>
-            <a:r>
-              <a:rPr lang="en-US" dirty="0"/>
-              <a:t>Alignment</a:t>
-            </a:r>
-          </a:p>
-          <a:p>
-            <a:r>
-              <a:rPr lang="en-US" dirty="0"/>
-              <a:t>Cohesion</a:t>
-            </a:r>
-          </a:p>
-          <a:p>
-            <a:r>
-              <a:rPr lang="en-US" dirty="0"/>
-              <a:t>Separation</a:t>
-            </a:r>
-          </a:p>
-          <a:p>
-            <a:endParaRPr lang="en-US" dirty="0"/>
-          </a:p>
-          <a:p>
-            <a:r>
-              <a:rPr lang="en-US" dirty="0"/>
-              <a:t>Of course…you can extend and add more rules</a:t>
-            </a:r>
-          </a:p>
-        </p:txBody>
-      </p:sp>
+              <a:t>Is it really a leaderless system?</a:t>
+            </a:r>
+          </a:p>
+          <a:p>
+            <a:pPr lvl="1"/>
+            <a:r>
+              <a:rPr lang="en-US" dirty="0"/>
+              <a:t>Consider flock formations such as the V formation</a:t>
+            </a:r>
+          </a:p>
+          <a:p>
+            <a:pPr lvl="1"/>
+            <a:endParaRPr lang="en-US" dirty="0"/>
+          </a:p>
+          <a:p>
+            <a:pPr lvl="1"/>
+            <a:endParaRPr lang="en-US" dirty="0"/>
+          </a:p>
+          <a:p>
+            <a:pPr lvl="1"/>
+            <a:endParaRPr lang="en-US" dirty="0"/>
+          </a:p>
+          <a:p>
+            <a:pPr lvl="1"/>
+            <a:endParaRPr lang="en-US" dirty="0"/>
+          </a:p>
+          <a:p>
+            <a:pPr lvl="1"/>
+            <a:endParaRPr lang="en-US" dirty="0"/>
+          </a:p>
+          <a:p>
+            <a:pPr lvl="1"/>
+            <a:endParaRPr lang="en-US" dirty="0"/>
+          </a:p>
+          <a:p>
+            <a:pPr lvl="1"/>
+            <a:endParaRPr lang="en-US" dirty="0"/>
+          </a:p>
+        </p:txBody>
+      </p:sp>
+      <p:pic>
+        <p:nvPicPr>
+          <p:cNvPr id="6" name="Picture 2" descr="Image result for v formation birds"/>
+          <p:cNvPicPr>
+            <a:picLocks noChangeAspect="1" noChangeArrowheads="1"/>
+          </p:cNvPicPr>
+          <p:nvPr/>
+        </p:nvPicPr>
+        <p:blipFill>
+          <a:blip r:embed="rId2">
+            <a:extLst>
+              <a:ext uri="{28A0092B-C50C-407E-A947-70E740481C1C}">
+                <a14:useLocalDpi xmlns:a14="http://schemas.microsoft.com/office/drawing/2010/main" val="0"/>
+              </a:ext>
+            </a:extLst>
+          </a:blip>
+          <a:srcRect/>
+          <a:stretch>
+            <a:fillRect/>
+          </a:stretch>
+        </p:blipFill>
+        <p:spPr bwMode="auto">
+          <a:xfrm>
+            <a:off x="3466925" y="3472589"/>
+            <a:ext cx="4452282" cy="2499638"/>
+          </a:xfrm>
+          <a:prstGeom prst="rect">
+            <a:avLst/>
+          </a:prstGeom>
+          <a:noFill/>
+          <a:extLst>
+            <a:ext uri="{909E8E84-426E-40DD-AFC4-6F175D3DCCD1}">
+              <a14:hiddenFill xmlns:a14="http://schemas.microsoft.com/office/drawing/2010/main">
+                <a:solidFill>
+                  <a:srgbClr val="FFFFFF"/>
+                </a:solidFill>
+              </a14:hiddenFill>
+            </a:ext>
+          </a:extLst>
+        </p:spPr>
+      </p:pic>
     </p:spTree>
     <p:extLst>
       <p:ext uri="{BB962C8B-B14F-4D97-AF65-F5344CB8AC3E}">
-        <p14:creationId xmlns:p14="http://schemas.microsoft.com/office/powerpoint/2010/main" val="1315973260"/>
+        <p14:creationId xmlns:p14="http://schemas.microsoft.com/office/powerpoint/2010/main" val="3948800857"/>
       </p:ext>
     </p:extLst>
   </p:cSld>
@@ -5624,7 +5982,7 @@
           <a:p>
             <a:r>
               <a:rPr lang="en-US" dirty="0"/>
-              <a:t>Alignment</a:t>
+              <a:t>Questions for Flocking</a:t>
             </a:r>
           </a:p>
         </p:txBody>
@@ -5639,185 +5997,110 @@
             <p:ph idx="1"/>
           </p:nvPr>
         </p:nvSpPr>
-        <p:spPr/>
+        <p:spPr>
+          <a:xfrm>
+            <a:off x="516708" y="2465568"/>
+            <a:ext cx="10554574" cy="4119790"/>
+          </a:xfrm>
+        </p:spPr>
         <p:txBody>
           <a:bodyPr/>
           <a:lstStyle/>
           <a:p>
             <a:r>
               <a:rPr lang="en-US" dirty="0"/>
-              <a:t>Alignment describes how each </a:t>
-            </a:r>
-            <a:r>
-              <a:rPr lang="en-US" dirty="0" err="1"/>
-              <a:t>boid</a:t>
-            </a:r>
-            <a:r>
-              <a:rPr lang="en-US" dirty="0"/>
-              <a:t> orients itself to the rest of the flock</a:t>
-            </a:r>
-          </a:p>
-          <a:p>
-            <a:r>
-              <a:rPr lang="en-US" dirty="0"/>
-              <a:t>Alignment pseudocode:</a:t>
-            </a:r>
-          </a:p>
-          <a:p>
-            <a:r>
-              <a:rPr lang="en-US" dirty="0" err="1"/>
-              <a:t>foreach</a:t>
-            </a:r>
-            <a:r>
-              <a:rPr lang="en-US" dirty="0"/>
-              <a:t> (</a:t>
-            </a:r>
-            <a:r>
-              <a:rPr lang="en-US" dirty="0" err="1"/>
-              <a:t>var</a:t>
-            </a:r>
-            <a:r>
-              <a:rPr lang="en-US" dirty="0"/>
-              <a:t> </a:t>
-            </a:r>
-            <a:r>
-              <a:rPr lang="en-US" dirty="0" err="1"/>
-              <a:t>boid</a:t>
-            </a:r>
-            <a:r>
-              <a:rPr lang="en-US" dirty="0"/>
-              <a:t> in </a:t>
-            </a:r>
-            <a:r>
-              <a:rPr lang="en-US" dirty="0" err="1"/>
-              <a:t>boids</a:t>
-            </a:r>
-            <a:r>
-              <a:rPr lang="en-US" dirty="0"/>
-              <a:t>)  {</a:t>
-            </a:r>
-            <a:br>
-              <a:rPr lang="en-US" dirty="0"/>
-            </a:br>
-            <a:r>
-              <a:rPr lang="en-US" dirty="0"/>
-              <a:t>		if (</a:t>
-            </a:r>
-            <a:r>
-              <a:rPr lang="en-US" dirty="0" err="1"/>
-              <a:t>currentBoid</a:t>
-            </a:r>
-            <a:r>
-              <a:rPr lang="en-US" dirty="0"/>
-              <a:t> != </a:t>
-            </a:r>
-            <a:r>
-              <a:rPr lang="en-US" dirty="0" err="1"/>
-              <a:t>boid</a:t>
-            </a:r>
-            <a:r>
-              <a:rPr lang="en-US" dirty="0"/>
-              <a:t>) {</a:t>
-            </a:r>
-            <a:br>
-              <a:rPr lang="en-US" dirty="0"/>
-            </a:br>
-            <a:r>
-              <a:rPr lang="en-US" dirty="0"/>
-              <a:t>			if (</a:t>
-            </a:r>
-            <a:r>
-              <a:rPr lang="en-US" dirty="0" err="1"/>
-              <a:t>IsNeighbor</a:t>
-            </a:r>
-            <a:r>
-              <a:rPr lang="en-US" dirty="0"/>
-              <a:t>(</a:t>
-            </a:r>
-            <a:r>
-              <a:rPr lang="en-US" dirty="0" err="1"/>
-              <a:t>currentBoid</a:t>
-            </a:r>
-            <a:r>
-              <a:rPr lang="en-US" dirty="0"/>
-              <a:t>, </a:t>
-            </a:r>
-            <a:r>
-              <a:rPr lang="en-US" dirty="0" err="1"/>
-              <a:t>boid</a:t>
-            </a:r>
-            <a:r>
-              <a:rPr lang="en-US" dirty="0"/>
-              <a:t>)) {</a:t>
-            </a:r>
-            <a:br>
-              <a:rPr lang="en-US" dirty="0"/>
-            </a:br>
-            <a:r>
-              <a:rPr lang="en-US" dirty="0"/>
-              <a:t>				alignment +=  velocity;</a:t>
-            </a:r>
-            <a:br>
-              <a:rPr lang="en-US" dirty="0"/>
-            </a:br>
-            <a:r>
-              <a:rPr lang="en-US" dirty="0"/>
-              <a:t>				</a:t>
-            </a:r>
-            <a:r>
-              <a:rPr lang="en-US" dirty="0" err="1"/>
-              <a:t>neighborCount</a:t>
-            </a:r>
-            <a:r>
-              <a:rPr lang="en-US" dirty="0"/>
-              <a:t>++;</a:t>
-            </a:r>
-            <a:br>
-              <a:rPr lang="en-US" dirty="0"/>
-            </a:br>
-            <a:r>
-              <a:rPr lang="en-US" dirty="0"/>
-              <a:t>			}</a:t>
-            </a:r>
-            <a:br>
-              <a:rPr lang="en-US" dirty="0"/>
-            </a:br>
-            <a:r>
-              <a:rPr lang="en-US" dirty="0"/>
-              <a:t>		}</a:t>
-            </a:r>
-            <a:br>
-              <a:rPr lang="en-US" dirty="0"/>
-            </a:br>
-            <a:r>
-              <a:rPr lang="en-US" dirty="0"/>
-              <a:t>		return (alignment / </a:t>
-            </a:r>
-            <a:r>
-              <a:rPr lang="en-US" dirty="0" err="1"/>
-              <a:t>neighborCount</a:t>
-            </a:r>
-            <a:r>
-              <a:rPr lang="en-US" dirty="0"/>
-              <a:t>).normalized;</a:t>
-            </a:r>
-            <a:br>
-              <a:rPr lang="en-US" dirty="0"/>
-            </a:br>
-            <a:r>
-              <a:rPr lang="en-US" dirty="0"/>
-              <a:t>}</a:t>
-            </a:r>
-          </a:p>
-          <a:p>
-            <a:endParaRPr lang="en-US" dirty="0"/>
-          </a:p>
-        </p:txBody>
-      </p:sp>
+              <a:t>Is it really a leaderless system?</a:t>
+            </a:r>
+          </a:p>
+          <a:p>
+            <a:pPr lvl="1"/>
+            <a:r>
+              <a:rPr lang="en-US" dirty="0"/>
+              <a:t>Consider flock formations such as the V formation</a:t>
+            </a:r>
+          </a:p>
+          <a:p>
+            <a:pPr lvl="1"/>
+            <a:endParaRPr lang="en-US" dirty="0"/>
+          </a:p>
+          <a:p>
+            <a:pPr lvl="1"/>
+            <a:endParaRPr lang="en-US" dirty="0"/>
+          </a:p>
+          <a:p>
+            <a:pPr lvl="1"/>
+            <a:endParaRPr lang="en-US" dirty="0"/>
+          </a:p>
+          <a:p>
+            <a:pPr lvl="1"/>
+            <a:endParaRPr lang="en-US" dirty="0"/>
+          </a:p>
+          <a:p>
+            <a:pPr lvl="1"/>
+            <a:endParaRPr lang="en-US" dirty="0"/>
+          </a:p>
+          <a:p>
+            <a:pPr lvl="1"/>
+            <a:endParaRPr lang="en-US" dirty="0"/>
+          </a:p>
+          <a:p>
+            <a:pPr lvl="1"/>
+            <a:endParaRPr lang="en-US" dirty="0"/>
+          </a:p>
+          <a:p>
+            <a:pPr lvl="1"/>
+            <a:r>
+              <a:rPr lang="en-US" dirty="0"/>
+              <a:t>Is the center bird considered the leader?</a:t>
+            </a:r>
+          </a:p>
+        </p:txBody>
+      </p:sp>
+      <p:pic>
+        <p:nvPicPr>
+          <p:cNvPr id="1026" name="Picture 2" descr="Image result for v formation birds"/>
+          <p:cNvPicPr>
+            <a:picLocks noChangeAspect="1" noChangeArrowheads="1"/>
+          </p:cNvPicPr>
+          <p:nvPr/>
+        </p:nvPicPr>
+        <p:blipFill>
+          <a:blip r:embed="rId2">
+            <a:extLst>
+              <a:ext uri="{28A0092B-C50C-407E-A947-70E740481C1C}">
+                <a14:useLocalDpi xmlns:a14="http://schemas.microsoft.com/office/drawing/2010/main" val="0"/>
+              </a:ext>
+            </a:extLst>
+          </a:blip>
+          <a:srcRect/>
+          <a:stretch>
+            <a:fillRect/>
+          </a:stretch>
+        </p:blipFill>
+        <p:spPr bwMode="auto">
+          <a:xfrm>
+            <a:off x="3466925" y="3472589"/>
+            <a:ext cx="4452282" cy="2499638"/>
+          </a:xfrm>
+          <a:prstGeom prst="rect">
+            <a:avLst/>
+          </a:prstGeom>
+          <a:noFill/>
+          <a:extLst>
+            <a:ext uri="{909E8E84-426E-40DD-AFC4-6F175D3DCCD1}">
+              <a14:hiddenFill xmlns:a14="http://schemas.microsoft.com/office/drawing/2010/main">
+                <a:solidFill>
+                  <a:srgbClr val="FFFFFF"/>
+                </a:solidFill>
+              </a14:hiddenFill>
+            </a:ext>
+          </a:extLst>
+        </p:spPr>
+      </p:pic>
     </p:spTree>
     <p:extLst>
       <p:ext uri="{BB962C8B-B14F-4D97-AF65-F5344CB8AC3E}">
-        <p14:creationId xmlns:p14="http://schemas.microsoft.com/office/powerpoint/2010/main" val="2161122574"/>
+        <p14:creationId xmlns:p14="http://schemas.microsoft.com/office/powerpoint/2010/main" val="1036131728"/>
       </p:ext>
     </p:extLst>
   </p:cSld>
@@ -5861,7 +6144,7 @@
           <a:p>
             <a:r>
               <a:rPr lang="en-US" dirty="0"/>
-              <a:t>Cohesion</a:t>
+              <a:t>Questions for Flocking</a:t>
             </a:r>
           </a:p>
         </p:txBody>
@@ -5876,201 +6159,40 @@
             <p:ph idx="1"/>
           </p:nvPr>
         </p:nvSpPr>
-        <p:spPr/>
+        <p:spPr>
+          <a:xfrm>
+            <a:off x="516708" y="2465568"/>
+            <a:ext cx="10554574" cy="4119790"/>
+          </a:xfrm>
+        </p:spPr>
         <p:txBody>
           <a:bodyPr/>
           <a:lstStyle/>
           <a:p>
             <a:r>
               <a:rPr lang="en-US" dirty="0"/>
-              <a:t>Cohesion describes the perceived center in which </a:t>
-            </a:r>
-            <a:r>
-              <a:rPr lang="en-US" dirty="0" err="1"/>
-              <a:t>boids</a:t>
-            </a:r>
-            <a:r>
-              <a:rPr lang="en-US" dirty="0"/>
-              <a:t> try to remain close to</a:t>
-            </a:r>
-          </a:p>
-          <a:p>
-            <a:r>
-              <a:rPr lang="en-US" dirty="0"/>
-              <a:t>Cohesion pseudocode</a:t>
-            </a:r>
-          </a:p>
-          <a:p>
-            <a:r>
-              <a:rPr lang="en-US" dirty="0" err="1"/>
-              <a:t>foreach</a:t>
-            </a:r>
-            <a:r>
-              <a:rPr lang="en-US" dirty="0"/>
-              <a:t> (</a:t>
-            </a:r>
-            <a:r>
-              <a:rPr lang="en-US" dirty="0" err="1"/>
-              <a:t>var</a:t>
-            </a:r>
-            <a:r>
-              <a:rPr lang="en-US" dirty="0"/>
-              <a:t> </a:t>
-            </a:r>
-            <a:r>
-              <a:rPr lang="en-US" dirty="0" err="1"/>
-              <a:t>boid</a:t>
-            </a:r>
-            <a:r>
-              <a:rPr lang="en-US" dirty="0"/>
-              <a:t> in </a:t>
-            </a:r>
-            <a:r>
-              <a:rPr lang="en-US" dirty="0" err="1"/>
-              <a:t>boids</a:t>
-            </a:r>
-            <a:r>
-              <a:rPr lang="en-US" dirty="0"/>
-              <a:t>)  {</a:t>
-            </a:r>
-            <a:br>
-              <a:rPr lang="en-US" dirty="0"/>
-            </a:br>
-            <a:r>
-              <a:rPr lang="en-US" dirty="0"/>
-              <a:t>		if (</a:t>
-            </a:r>
-            <a:r>
-              <a:rPr lang="en-US" dirty="0" err="1"/>
-              <a:t>currentBoid</a:t>
-            </a:r>
-            <a:r>
-              <a:rPr lang="en-US" dirty="0"/>
-              <a:t> != </a:t>
-            </a:r>
-            <a:r>
-              <a:rPr lang="en-US" dirty="0" err="1"/>
-              <a:t>boid</a:t>
-            </a:r>
-            <a:r>
-              <a:rPr lang="en-US" dirty="0"/>
-              <a:t>) {</a:t>
-            </a:r>
-            <a:br>
-              <a:rPr lang="en-US" dirty="0"/>
-            </a:br>
-            <a:r>
-              <a:rPr lang="en-US" dirty="0"/>
-              <a:t>			if (</a:t>
-            </a:r>
-            <a:r>
-              <a:rPr lang="en-US" dirty="0" err="1"/>
-              <a:t>IsNeighbor</a:t>
-            </a:r>
-            <a:r>
-              <a:rPr lang="en-US" dirty="0"/>
-              <a:t>(</a:t>
-            </a:r>
-            <a:r>
-              <a:rPr lang="en-US" dirty="0" err="1"/>
-              <a:t>currentBoid</a:t>
-            </a:r>
-            <a:r>
-              <a:rPr lang="en-US" dirty="0"/>
-              <a:t>, </a:t>
-            </a:r>
-            <a:r>
-              <a:rPr lang="en-US" dirty="0" err="1"/>
-              <a:t>boid</a:t>
-            </a:r>
-            <a:r>
-              <a:rPr lang="en-US" dirty="0"/>
-              <a:t>)) {</a:t>
-            </a:r>
-            <a:br>
-              <a:rPr lang="en-US" dirty="0"/>
-            </a:br>
-            <a:r>
-              <a:rPr lang="en-US" dirty="0"/>
-              <a:t>				cohesion += </a:t>
-            </a:r>
-            <a:r>
-              <a:rPr lang="en-US" dirty="0" err="1"/>
-              <a:t>boid.position</a:t>
-            </a:r>
-            <a:r>
-              <a:rPr lang="en-US" dirty="0"/>
-              <a:t>;</a:t>
-            </a:r>
-            <a:br>
-              <a:rPr lang="en-US" dirty="0"/>
-            </a:br>
-            <a:r>
-              <a:rPr lang="en-US" dirty="0"/>
-              <a:t>				</a:t>
-            </a:r>
-            <a:r>
-              <a:rPr lang="en-US" dirty="0" err="1"/>
-              <a:t>neighborCount</a:t>
-            </a:r>
-            <a:r>
-              <a:rPr lang="en-US" dirty="0"/>
-              <a:t>++;</a:t>
-            </a:r>
-            <a:br>
-              <a:rPr lang="en-US" dirty="0"/>
-            </a:br>
-            <a:r>
-              <a:rPr lang="en-US" dirty="0"/>
-              <a:t>			}</a:t>
-            </a:r>
-            <a:br>
-              <a:rPr lang="en-US" dirty="0"/>
-            </a:br>
-            <a:r>
-              <a:rPr lang="en-US" dirty="0"/>
-              <a:t>		}</a:t>
-            </a:r>
-            <a:br>
-              <a:rPr lang="en-US" dirty="0"/>
-            </a:br>
-            <a:r>
-              <a:rPr lang="en-US" dirty="0"/>
-              <a:t>		return ((cohesion / </a:t>
-            </a:r>
-            <a:r>
-              <a:rPr lang="en-US" dirty="0" err="1"/>
-              <a:t>neighborCount</a:t>
-            </a:r>
-            <a:r>
-              <a:rPr lang="en-US" dirty="0"/>
-              <a:t>) – </a:t>
-            </a:r>
-            <a:r>
-              <a:rPr lang="en-US" dirty="0" err="1"/>
-              <a:t>currentBoid.position</a:t>
-            </a:r>
-            <a:r>
-              <a:rPr lang="en-US" dirty="0"/>
-              <a:t>).normalized;</a:t>
-            </a:r>
-            <a:br>
-              <a:rPr lang="en-US" dirty="0"/>
-            </a:br>
-            <a:r>
-              <a:rPr lang="en-US" dirty="0"/>
-              <a:t>}</a:t>
-            </a:r>
-          </a:p>
-          <a:p>
-            <a:endParaRPr lang="en-US" dirty="0"/>
+              <a:t>How do birds all turn relatively simultaneously?</a:t>
+            </a:r>
+          </a:p>
+          <a:p>
+            <a:pPr lvl="1"/>
+            <a:r>
+              <a:rPr lang="en-US" dirty="0"/>
+              <a:t>Does one bird turn first and everyone follows like the rippling affect?</a:t>
+            </a:r>
+          </a:p>
+          <a:p>
+            <a:r>
+              <a:rPr lang="en-US" dirty="0"/>
+              <a:t>How do other organisms perceive velocity?</a:t>
+            </a:r>
           </a:p>
         </p:txBody>
       </p:sp>
     </p:spTree>
     <p:extLst>
       <p:ext uri="{BB962C8B-B14F-4D97-AF65-F5344CB8AC3E}">
-        <p14:creationId xmlns:p14="http://schemas.microsoft.com/office/powerpoint/2010/main" val="937713980"/>
+        <p14:creationId xmlns:p14="http://schemas.microsoft.com/office/powerpoint/2010/main" val="542049256"/>
       </p:ext>
     </p:extLst>
   </p:cSld>
@@ -6114,202 +6236,79 @@
           <a:p>
             <a:r>
               <a:rPr lang="en-US" dirty="0"/>
+              <a:t>Rules of Flocking</a:t>
+            </a:r>
+          </a:p>
+        </p:txBody>
+      </p:sp>
+      <p:sp>
+        <p:nvSpPr>
+          <p:cNvPr id="3" name="Content Placeholder 2"/>
+          <p:cNvSpPr>
+            <a:spLocks noGrp="1"/>
+          </p:cNvSpPr>
+          <p:nvPr>
+            <p:ph idx="1"/>
+          </p:nvPr>
+        </p:nvSpPr>
+        <p:spPr/>
+        <p:txBody>
+          <a:bodyPr/>
+          <a:lstStyle/>
+          <a:p>
+            <a:r>
+              <a:rPr lang="en-US" dirty="0"/>
+              <a:t>Under Craig Reynold’s implementation, flocking can be designed using 3 rules</a:t>
+            </a:r>
+          </a:p>
+          <a:p>
+            <a:pPr lvl="1"/>
+            <a:r>
+              <a:rPr lang="en-US" dirty="0"/>
+              <a:t>Alignment</a:t>
+            </a:r>
+          </a:p>
+          <a:p>
+            <a:pPr lvl="1"/>
+            <a:r>
+              <a:rPr lang="en-US" dirty="0"/>
+              <a:t>Cohesion</a:t>
+            </a:r>
+          </a:p>
+          <a:p>
+            <a:pPr lvl="1"/>
+            <a:r>
+              <a:rPr lang="en-US" dirty="0"/>
               <a:t>Separation</a:t>
             </a:r>
           </a:p>
-        </p:txBody>
-      </p:sp>
-      <p:sp>
-        <p:nvSpPr>
-          <p:cNvPr id="3" name="Content Placeholder 2"/>
-          <p:cNvSpPr>
-            <a:spLocks noGrp="1"/>
-          </p:cNvSpPr>
-          <p:nvPr>
-            <p:ph idx="1"/>
-          </p:nvPr>
-        </p:nvSpPr>
-        <p:spPr/>
-        <p:txBody>
-          <a:bodyPr/>
-          <a:lstStyle/>
-          <a:p>
-            <a:r>
-              <a:rPr lang="en-US" dirty="0"/>
-              <a:t>Separation determines the distance between each </a:t>
-            </a:r>
-            <a:r>
-              <a:rPr lang="en-US" dirty="0" err="1"/>
-              <a:t>boid</a:t>
-            </a:r>
-            <a:endParaRPr lang="en-US" dirty="0"/>
-          </a:p>
-          <a:p>
-            <a:r>
-              <a:rPr lang="en-US" dirty="0"/>
-              <a:t>Separation pseudocode:</a:t>
-            </a:r>
-          </a:p>
-          <a:p>
-            <a:r>
-              <a:rPr lang="en-US" dirty="0" err="1"/>
-              <a:t>foreach</a:t>
-            </a:r>
-            <a:r>
-              <a:rPr lang="en-US" dirty="0"/>
-              <a:t> (</a:t>
-            </a:r>
-            <a:r>
-              <a:rPr lang="en-US" dirty="0" err="1"/>
-              <a:t>var</a:t>
-            </a:r>
-            <a:r>
-              <a:rPr lang="en-US" dirty="0"/>
-              <a:t> </a:t>
-            </a:r>
-            <a:r>
-              <a:rPr lang="en-US" dirty="0" err="1"/>
-              <a:t>boid</a:t>
-            </a:r>
-            <a:r>
-              <a:rPr lang="en-US" dirty="0"/>
-              <a:t> in </a:t>
-            </a:r>
-            <a:r>
-              <a:rPr lang="en-US" dirty="0" err="1"/>
-              <a:t>boids</a:t>
-            </a:r>
-            <a:r>
-              <a:rPr lang="en-US" dirty="0"/>
-              <a:t>)  {</a:t>
-            </a:r>
-            <a:br>
-              <a:rPr lang="en-US" dirty="0"/>
-            </a:br>
-            <a:r>
-              <a:rPr lang="en-US" dirty="0"/>
-              <a:t>		if (</a:t>
-            </a:r>
-            <a:r>
-              <a:rPr lang="en-US" dirty="0" err="1"/>
-              <a:t>currentBoid</a:t>
-            </a:r>
-            <a:r>
-              <a:rPr lang="en-US" dirty="0"/>
-              <a:t> != </a:t>
-            </a:r>
-            <a:r>
-              <a:rPr lang="en-US" dirty="0" err="1"/>
-              <a:t>boid</a:t>
-            </a:r>
-            <a:r>
-              <a:rPr lang="en-US" dirty="0"/>
-              <a:t>) {</a:t>
-            </a:r>
-            <a:br>
-              <a:rPr lang="en-US" dirty="0"/>
-            </a:br>
-            <a:r>
-              <a:rPr lang="en-US" dirty="0"/>
-              <a:t>			if (</a:t>
-            </a:r>
-            <a:r>
-              <a:rPr lang="en-US" dirty="0" err="1"/>
-              <a:t>IsNeighbor</a:t>
-            </a:r>
-            <a:r>
-              <a:rPr lang="en-US" dirty="0"/>
-              <a:t>(</a:t>
-            </a:r>
-            <a:r>
-              <a:rPr lang="en-US" dirty="0" err="1"/>
-              <a:t>currentBoid</a:t>
-            </a:r>
-            <a:r>
-              <a:rPr lang="en-US" dirty="0"/>
-              <a:t>, </a:t>
-            </a:r>
-            <a:r>
-              <a:rPr lang="en-US" dirty="0" err="1"/>
-              <a:t>boid</a:t>
-            </a:r>
-            <a:r>
-              <a:rPr lang="en-US" dirty="0"/>
-              <a:t>)) {</a:t>
-            </a:r>
-            <a:br>
-              <a:rPr lang="en-US" dirty="0"/>
-            </a:br>
-            <a:r>
-              <a:rPr lang="en-US" dirty="0"/>
-              <a:t>				separation += (</a:t>
-            </a:r>
-            <a:r>
-              <a:rPr lang="en-US" dirty="0" err="1"/>
-              <a:t>boid.position</a:t>
-            </a:r>
-            <a:r>
-              <a:rPr lang="en-US" dirty="0"/>
-              <a:t>  - </a:t>
-            </a:r>
-            <a:r>
-              <a:rPr lang="en-US" dirty="0" err="1"/>
-              <a:t>currentBoid.position</a:t>
-            </a:r>
-            <a:r>
-              <a:rPr lang="en-US" dirty="0"/>
-              <a:t>);</a:t>
-            </a:r>
-            <a:br>
-              <a:rPr lang="en-US" dirty="0"/>
-            </a:br>
-            <a:r>
-              <a:rPr lang="en-US" dirty="0"/>
-              <a:t>				</a:t>
-            </a:r>
-            <a:r>
-              <a:rPr lang="en-US" dirty="0" err="1"/>
-              <a:t>neighborCount</a:t>
-            </a:r>
-            <a:r>
-              <a:rPr lang="en-US" dirty="0"/>
-              <a:t>++;</a:t>
-            </a:r>
-            <a:br>
-              <a:rPr lang="en-US" dirty="0"/>
-            </a:br>
-            <a:r>
-              <a:rPr lang="en-US" dirty="0"/>
-              <a:t>			}</a:t>
-            </a:r>
-            <a:br>
-              <a:rPr lang="en-US" dirty="0"/>
-            </a:br>
-            <a:r>
-              <a:rPr lang="en-US" dirty="0"/>
-              <a:t>		}</a:t>
-            </a:r>
-            <a:br>
-              <a:rPr lang="en-US" dirty="0"/>
-            </a:br>
-            <a:r>
-              <a:rPr lang="en-US" dirty="0"/>
-              <a:t>		return ((separation / </a:t>
-            </a:r>
-            <a:r>
-              <a:rPr lang="en-US" dirty="0" err="1"/>
-              <a:t>neighborCount</a:t>
-            </a:r>
-            <a:r>
-              <a:rPr lang="en-US" dirty="0"/>
-              <a:t>) * -1).normalized;</a:t>
-            </a:r>
-            <a:br>
-              <a:rPr lang="en-US" dirty="0"/>
-            </a:br>
-            <a:r>
-              <a:rPr lang="en-US" dirty="0"/>
-              <a:t>}</a:t>
+          <a:p>
+            <a:endParaRPr lang="en-US" dirty="0"/>
+          </a:p>
+          <a:p>
+            <a:r>
+              <a:rPr lang="en-US" dirty="0"/>
+              <a:t>Of course…you can extend and add more rules</a:t>
+            </a:r>
+          </a:p>
+          <a:p>
+            <a:pPr lvl="1"/>
+            <a:r>
+              <a:rPr lang="en-US" dirty="0"/>
+              <a:t>Perching</a:t>
+            </a:r>
+          </a:p>
+          <a:p>
+            <a:pPr lvl="1"/>
+            <a:r>
+              <a:rPr lang="en-US" dirty="0"/>
+              <a:t>Avoiding a particular place</a:t>
+            </a:r>
+          </a:p>
+          <a:p>
+            <a:r>
+              <a:rPr lang="en-US" dirty="0"/>
+              <a:t>Essentially, all Reynolds describes is simply manipulation of velocity to enforce these rules</a:t>
             </a:r>
           </a:p>
         </p:txBody>
@@ -6317,7 +6316,7 @@
     </p:spTree>
     <p:extLst>
       <p:ext uri="{BB962C8B-B14F-4D97-AF65-F5344CB8AC3E}">
-        <p14:creationId xmlns:p14="http://schemas.microsoft.com/office/powerpoint/2010/main" val="820855311"/>
+        <p14:creationId xmlns:p14="http://schemas.microsoft.com/office/powerpoint/2010/main" val="1315973260"/>
       </p:ext>
     </p:extLst>
   </p:cSld>
@@ -6361,7 +6360,7 @@
           <a:p>
             <a:r>
               <a:rPr lang="en-US" dirty="0"/>
-              <a:t>Uses of Flocking</a:t>
+              <a:t>Alignment</a:t>
             </a:r>
           </a:p>
         </p:txBody>
@@ -6383,22 +6382,678 @@
           <a:p>
             <a:r>
               <a:rPr lang="en-US" dirty="0"/>
-              <a:t>Flocking is a form of multi agent support </a:t>
-            </a:r>
-          </a:p>
-          <a:p>
-            <a:pPr lvl="1"/>
-            <a:r>
-              <a:rPr lang="en-US" dirty="0"/>
-              <a:t>It is especially useful in robotics navigating a large amount.</a:t>
-            </a:r>
+              <a:t>Alignment describes how each </a:t>
+            </a:r>
+            <a:r>
+              <a:rPr lang="en-US" dirty="0" err="1"/>
+              <a:t>boid</a:t>
+            </a:r>
+            <a:r>
+              <a:rPr lang="en-US" dirty="0"/>
+              <a:t> orients itself to the rest of the flock</a:t>
+            </a:r>
+          </a:p>
+          <a:p>
+            <a:r>
+              <a:rPr lang="en-US" dirty="0"/>
+              <a:t>Alignment pseudocode:</a:t>
+            </a:r>
+          </a:p>
+          <a:p>
+            <a:r>
+              <a:rPr lang="en-US" dirty="0" err="1"/>
+              <a:t>foreach</a:t>
+            </a:r>
+            <a:r>
+              <a:rPr lang="en-US" dirty="0"/>
+              <a:t> (</a:t>
+            </a:r>
+            <a:r>
+              <a:rPr lang="en-US" dirty="0" err="1"/>
+              <a:t>var</a:t>
+            </a:r>
+            <a:r>
+              <a:rPr lang="en-US" dirty="0"/>
+              <a:t> </a:t>
+            </a:r>
+            <a:r>
+              <a:rPr lang="en-US" dirty="0" err="1"/>
+              <a:t>boid</a:t>
+            </a:r>
+            <a:r>
+              <a:rPr lang="en-US" dirty="0"/>
+              <a:t> in </a:t>
+            </a:r>
+            <a:r>
+              <a:rPr lang="en-US" dirty="0" err="1"/>
+              <a:t>boids</a:t>
+            </a:r>
+            <a:r>
+              <a:rPr lang="en-US" dirty="0"/>
+              <a:t>)  {</a:t>
+            </a:r>
+            <a:br>
+              <a:rPr lang="en-US" dirty="0"/>
+            </a:br>
+            <a:r>
+              <a:rPr lang="en-US" dirty="0"/>
+              <a:t>		if (</a:t>
+            </a:r>
+            <a:r>
+              <a:rPr lang="en-US" dirty="0" err="1"/>
+              <a:t>currentBoid</a:t>
+            </a:r>
+            <a:r>
+              <a:rPr lang="en-US" dirty="0"/>
+              <a:t> != </a:t>
+            </a:r>
+            <a:r>
+              <a:rPr lang="en-US" dirty="0" err="1"/>
+              <a:t>boid</a:t>
+            </a:r>
+            <a:r>
+              <a:rPr lang="en-US" dirty="0"/>
+              <a:t>) {</a:t>
+            </a:r>
+            <a:br>
+              <a:rPr lang="en-US" dirty="0"/>
+            </a:br>
+            <a:r>
+              <a:rPr lang="en-US" dirty="0"/>
+              <a:t>			if (</a:t>
+            </a:r>
+            <a:r>
+              <a:rPr lang="en-US" dirty="0" err="1"/>
+              <a:t>IsNeighbor</a:t>
+            </a:r>
+            <a:r>
+              <a:rPr lang="en-US" dirty="0"/>
+              <a:t>(</a:t>
+            </a:r>
+            <a:r>
+              <a:rPr lang="en-US" dirty="0" err="1"/>
+              <a:t>currentBoid</a:t>
+            </a:r>
+            <a:r>
+              <a:rPr lang="en-US" dirty="0"/>
+              <a:t>, </a:t>
+            </a:r>
+            <a:r>
+              <a:rPr lang="en-US" dirty="0" err="1"/>
+              <a:t>boid</a:t>
+            </a:r>
+            <a:r>
+              <a:rPr lang="en-US" dirty="0"/>
+              <a:t>)) {</a:t>
+            </a:r>
+            <a:br>
+              <a:rPr lang="en-US" dirty="0"/>
+            </a:br>
+            <a:r>
+              <a:rPr lang="en-US" dirty="0"/>
+              <a:t>				alignment +=  velocity;</a:t>
+            </a:r>
+            <a:br>
+              <a:rPr lang="en-US" dirty="0"/>
+            </a:br>
+            <a:r>
+              <a:rPr lang="en-US" dirty="0"/>
+              <a:t>				</a:t>
+            </a:r>
+            <a:r>
+              <a:rPr lang="en-US" dirty="0" err="1"/>
+              <a:t>neighborCount</a:t>
+            </a:r>
+            <a:r>
+              <a:rPr lang="en-US" dirty="0"/>
+              <a:t>++;</a:t>
+            </a:r>
+            <a:br>
+              <a:rPr lang="en-US" dirty="0"/>
+            </a:br>
+            <a:r>
+              <a:rPr lang="en-US" dirty="0"/>
+              <a:t>			}</a:t>
+            </a:r>
+            <a:br>
+              <a:rPr lang="en-US" dirty="0"/>
+            </a:br>
+            <a:r>
+              <a:rPr lang="en-US" dirty="0"/>
+              <a:t>		}</a:t>
+            </a:r>
+            <a:br>
+              <a:rPr lang="en-US" dirty="0"/>
+            </a:br>
+            <a:r>
+              <a:rPr lang="en-US" dirty="0"/>
+              <a:t>		return (alignment / </a:t>
+            </a:r>
+            <a:r>
+              <a:rPr lang="en-US" dirty="0" err="1"/>
+              <a:t>neighborCount</a:t>
+            </a:r>
+            <a:r>
+              <a:rPr lang="en-US" dirty="0"/>
+              <a:t>).normalized;</a:t>
+            </a:r>
+            <a:br>
+              <a:rPr lang="en-US" dirty="0"/>
+            </a:br>
+            <a:r>
+              <a:rPr lang="en-US" dirty="0"/>
+              <a:t>}</a:t>
+            </a:r>
+          </a:p>
+          <a:p>
+            <a:endParaRPr lang="en-US" dirty="0"/>
           </a:p>
         </p:txBody>
       </p:sp>
     </p:spTree>
     <p:extLst>
       <p:ext uri="{BB962C8B-B14F-4D97-AF65-F5344CB8AC3E}">
-        <p14:creationId xmlns:p14="http://schemas.microsoft.com/office/powerpoint/2010/main" val="2618662776"/>
+        <p14:creationId xmlns:p14="http://schemas.microsoft.com/office/powerpoint/2010/main" val="2161122574"/>
+      </p:ext>
+    </p:extLst>
+  </p:cSld>
+  <p:clrMapOvr>
+    <a:masterClrMapping/>
+  </p:clrMapOvr>
+</p:sld>
+</file>
+
+<file path=ppt/slides/slide8.xml><?xml version="1.0" encoding="utf-8"?>
+<p:sld xmlns:a="http://schemas.openxmlformats.org/drawingml/2006/main" xmlns:r="http://schemas.openxmlformats.org/officeDocument/2006/relationships" xmlns:p="http://schemas.openxmlformats.org/presentationml/2006/main">
+  <p:cSld>
+    <p:spTree>
+      <p:nvGrpSpPr>
+        <p:cNvPr id="1" name=""/>
+        <p:cNvGrpSpPr/>
+        <p:nvPr/>
+      </p:nvGrpSpPr>
+      <p:grpSpPr>
+        <a:xfrm>
+          <a:off x="0" y="0"/>
+          <a:ext cx="0" cy="0"/>
+          <a:chOff x="0" y="0"/>
+          <a:chExt cx="0" cy="0"/>
+        </a:xfrm>
+      </p:grpSpPr>
+      <p:sp>
+        <p:nvSpPr>
+          <p:cNvPr id="2" name="Title 1"/>
+          <p:cNvSpPr>
+            <a:spLocks noGrp="1"/>
+          </p:cNvSpPr>
+          <p:nvPr>
+            <p:ph type="title"/>
+          </p:nvPr>
+        </p:nvSpPr>
+        <p:spPr/>
+        <p:txBody>
+          <a:bodyPr/>
+          <a:lstStyle/>
+          <a:p>
+            <a:r>
+              <a:rPr lang="en-US" dirty="0"/>
+              <a:t>Cohesion</a:t>
+            </a:r>
+          </a:p>
+        </p:txBody>
+      </p:sp>
+      <p:sp>
+        <p:nvSpPr>
+          <p:cNvPr id="3" name="Content Placeholder 2"/>
+          <p:cNvSpPr>
+            <a:spLocks noGrp="1"/>
+          </p:cNvSpPr>
+          <p:nvPr>
+            <p:ph idx="1"/>
+          </p:nvPr>
+        </p:nvSpPr>
+        <p:spPr/>
+        <p:txBody>
+          <a:bodyPr/>
+          <a:lstStyle/>
+          <a:p>
+            <a:r>
+              <a:rPr lang="en-US" dirty="0"/>
+              <a:t>Cohesion describes the perceived center in which </a:t>
+            </a:r>
+            <a:r>
+              <a:rPr lang="en-US" dirty="0" err="1"/>
+              <a:t>boids</a:t>
+            </a:r>
+            <a:r>
+              <a:rPr lang="en-US" dirty="0"/>
+              <a:t> try to remain close to</a:t>
+            </a:r>
+          </a:p>
+          <a:p>
+            <a:r>
+              <a:rPr lang="en-US" dirty="0"/>
+              <a:t>Cohesion pseudocode</a:t>
+            </a:r>
+          </a:p>
+          <a:p>
+            <a:r>
+              <a:rPr lang="en-US" dirty="0" err="1"/>
+              <a:t>foreach</a:t>
+            </a:r>
+            <a:r>
+              <a:rPr lang="en-US" dirty="0"/>
+              <a:t> (</a:t>
+            </a:r>
+            <a:r>
+              <a:rPr lang="en-US" dirty="0" err="1"/>
+              <a:t>var</a:t>
+            </a:r>
+            <a:r>
+              <a:rPr lang="en-US" dirty="0"/>
+              <a:t> </a:t>
+            </a:r>
+            <a:r>
+              <a:rPr lang="en-US" dirty="0" err="1"/>
+              <a:t>boid</a:t>
+            </a:r>
+            <a:r>
+              <a:rPr lang="en-US" dirty="0"/>
+              <a:t> in </a:t>
+            </a:r>
+            <a:r>
+              <a:rPr lang="en-US" dirty="0" err="1"/>
+              <a:t>boids</a:t>
+            </a:r>
+            <a:r>
+              <a:rPr lang="en-US" dirty="0"/>
+              <a:t>)  {</a:t>
+            </a:r>
+            <a:br>
+              <a:rPr lang="en-US" dirty="0"/>
+            </a:br>
+            <a:r>
+              <a:rPr lang="en-US" dirty="0"/>
+              <a:t>		if (</a:t>
+            </a:r>
+            <a:r>
+              <a:rPr lang="en-US" dirty="0" err="1"/>
+              <a:t>currentBoid</a:t>
+            </a:r>
+            <a:r>
+              <a:rPr lang="en-US" dirty="0"/>
+              <a:t> != </a:t>
+            </a:r>
+            <a:r>
+              <a:rPr lang="en-US" dirty="0" err="1"/>
+              <a:t>boid</a:t>
+            </a:r>
+            <a:r>
+              <a:rPr lang="en-US" dirty="0"/>
+              <a:t>) {</a:t>
+            </a:r>
+            <a:br>
+              <a:rPr lang="en-US" dirty="0"/>
+            </a:br>
+            <a:r>
+              <a:rPr lang="en-US" dirty="0"/>
+              <a:t>			if (</a:t>
+            </a:r>
+            <a:r>
+              <a:rPr lang="en-US" dirty="0" err="1"/>
+              <a:t>IsNeighbor</a:t>
+            </a:r>
+            <a:r>
+              <a:rPr lang="en-US" dirty="0"/>
+              <a:t>(</a:t>
+            </a:r>
+            <a:r>
+              <a:rPr lang="en-US" dirty="0" err="1"/>
+              <a:t>currentBoid</a:t>
+            </a:r>
+            <a:r>
+              <a:rPr lang="en-US" dirty="0"/>
+              <a:t>, </a:t>
+            </a:r>
+            <a:r>
+              <a:rPr lang="en-US" dirty="0" err="1"/>
+              <a:t>boid</a:t>
+            </a:r>
+            <a:r>
+              <a:rPr lang="en-US" dirty="0"/>
+              <a:t>)) {</a:t>
+            </a:r>
+            <a:br>
+              <a:rPr lang="en-US" dirty="0"/>
+            </a:br>
+            <a:r>
+              <a:rPr lang="en-US" dirty="0"/>
+              <a:t>				cohesion += </a:t>
+            </a:r>
+            <a:r>
+              <a:rPr lang="en-US" dirty="0" err="1"/>
+              <a:t>boid.position</a:t>
+            </a:r>
+            <a:r>
+              <a:rPr lang="en-US" dirty="0"/>
+              <a:t>;</a:t>
+            </a:r>
+            <a:br>
+              <a:rPr lang="en-US" dirty="0"/>
+            </a:br>
+            <a:r>
+              <a:rPr lang="en-US" dirty="0"/>
+              <a:t>				</a:t>
+            </a:r>
+            <a:r>
+              <a:rPr lang="en-US" dirty="0" err="1"/>
+              <a:t>neighborCount</a:t>
+            </a:r>
+            <a:r>
+              <a:rPr lang="en-US" dirty="0"/>
+              <a:t>++;</a:t>
+            </a:r>
+            <a:br>
+              <a:rPr lang="en-US" dirty="0"/>
+            </a:br>
+            <a:r>
+              <a:rPr lang="en-US" dirty="0"/>
+              <a:t>			}</a:t>
+            </a:r>
+            <a:br>
+              <a:rPr lang="en-US" dirty="0"/>
+            </a:br>
+            <a:r>
+              <a:rPr lang="en-US" dirty="0"/>
+              <a:t>		}</a:t>
+            </a:r>
+            <a:br>
+              <a:rPr lang="en-US" dirty="0"/>
+            </a:br>
+            <a:r>
+              <a:rPr lang="en-US" dirty="0"/>
+              <a:t>		return ((cohesion / </a:t>
+            </a:r>
+            <a:r>
+              <a:rPr lang="en-US" dirty="0" err="1"/>
+              <a:t>neighborCount</a:t>
+            </a:r>
+            <a:r>
+              <a:rPr lang="en-US" dirty="0"/>
+              <a:t>) – </a:t>
+            </a:r>
+            <a:r>
+              <a:rPr lang="en-US" dirty="0" err="1"/>
+              <a:t>currentBoid.position</a:t>
+            </a:r>
+            <a:r>
+              <a:rPr lang="en-US" dirty="0"/>
+              <a:t>).normalized;</a:t>
+            </a:r>
+            <a:br>
+              <a:rPr lang="en-US" dirty="0"/>
+            </a:br>
+            <a:r>
+              <a:rPr lang="en-US" dirty="0"/>
+              <a:t>}</a:t>
+            </a:r>
+          </a:p>
+          <a:p>
+            <a:endParaRPr lang="en-US" dirty="0"/>
+          </a:p>
+        </p:txBody>
+      </p:sp>
+    </p:spTree>
+    <p:extLst>
+      <p:ext uri="{BB962C8B-B14F-4D97-AF65-F5344CB8AC3E}">
+        <p14:creationId xmlns:p14="http://schemas.microsoft.com/office/powerpoint/2010/main" val="937713980"/>
+      </p:ext>
+    </p:extLst>
+  </p:cSld>
+  <p:clrMapOvr>
+    <a:masterClrMapping/>
+  </p:clrMapOvr>
+</p:sld>
+</file>
+
+<file path=ppt/slides/slide9.xml><?xml version="1.0" encoding="utf-8"?>
+<p:sld xmlns:a="http://schemas.openxmlformats.org/drawingml/2006/main" xmlns:r="http://schemas.openxmlformats.org/officeDocument/2006/relationships" xmlns:p="http://schemas.openxmlformats.org/presentationml/2006/main">
+  <p:cSld>
+    <p:spTree>
+      <p:nvGrpSpPr>
+        <p:cNvPr id="1" name=""/>
+        <p:cNvGrpSpPr/>
+        <p:nvPr/>
+      </p:nvGrpSpPr>
+      <p:grpSpPr>
+        <a:xfrm>
+          <a:off x="0" y="0"/>
+          <a:ext cx="0" cy="0"/>
+          <a:chOff x="0" y="0"/>
+          <a:chExt cx="0" cy="0"/>
+        </a:xfrm>
+      </p:grpSpPr>
+      <p:sp>
+        <p:nvSpPr>
+          <p:cNvPr id="2" name="Title 1"/>
+          <p:cNvSpPr>
+            <a:spLocks noGrp="1"/>
+          </p:cNvSpPr>
+          <p:nvPr>
+            <p:ph type="title"/>
+          </p:nvPr>
+        </p:nvSpPr>
+        <p:spPr/>
+        <p:txBody>
+          <a:bodyPr/>
+          <a:lstStyle/>
+          <a:p>
+            <a:r>
+              <a:rPr lang="en-US" dirty="0"/>
+              <a:t>Separation</a:t>
+            </a:r>
+          </a:p>
+        </p:txBody>
+      </p:sp>
+      <p:sp>
+        <p:nvSpPr>
+          <p:cNvPr id="3" name="Content Placeholder 2"/>
+          <p:cNvSpPr>
+            <a:spLocks noGrp="1"/>
+          </p:cNvSpPr>
+          <p:nvPr>
+            <p:ph idx="1"/>
+          </p:nvPr>
+        </p:nvSpPr>
+        <p:spPr/>
+        <p:txBody>
+          <a:bodyPr/>
+          <a:lstStyle/>
+          <a:p>
+            <a:r>
+              <a:rPr lang="en-US" dirty="0"/>
+              <a:t>Separation determines the distance between each </a:t>
+            </a:r>
+            <a:r>
+              <a:rPr lang="en-US" dirty="0" err="1"/>
+              <a:t>boid</a:t>
+            </a:r>
+            <a:endParaRPr lang="en-US" dirty="0"/>
+          </a:p>
+          <a:p>
+            <a:r>
+              <a:rPr lang="en-US" dirty="0"/>
+              <a:t>Separation pseudocode:</a:t>
+            </a:r>
+          </a:p>
+          <a:p>
+            <a:r>
+              <a:rPr lang="en-US" dirty="0" err="1"/>
+              <a:t>foreach</a:t>
+            </a:r>
+            <a:r>
+              <a:rPr lang="en-US" dirty="0"/>
+              <a:t> (</a:t>
+            </a:r>
+            <a:r>
+              <a:rPr lang="en-US" dirty="0" err="1"/>
+              <a:t>var</a:t>
+            </a:r>
+            <a:r>
+              <a:rPr lang="en-US" dirty="0"/>
+              <a:t> </a:t>
+            </a:r>
+            <a:r>
+              <a:rPr lang="en-US" dirty="0" err="1"/>
+              <a:t>boid</a:t>
+            </a:r>
+            <a:r>
+              <a:rPr lang="en-US" dirty="0"/>
+              <a:t> in </a:t>
+            </a:r>
+            <a:r>
+              <a:rPr lang="en-US" dirty="0" err="1"/>
+              <a:t>boids</a:t>
+            </a:r>
+            <a:r>
+              <a:rPr lang="en-US" dirty="0"/>
+              <a:t>)  {</a:t>
+            </a:r>
+            <a:br>
+              <a:rPr lang="en-US" dirty="0"/>
+            </a:br>
+            <a:r>
+              <a:rPr lang="en-US" dirty="0"/>
+              <a:t>		if (</a:t>
+            </a:r>
+            <a:r>
+              <a:rPr lang="en-US" dirty="0" err="1"/>
+              <a:t>currentBoid</a:t>
+            </a:r>
+            <a:r>
+              <a:rPr lang="en-US" dirty="0"/>
+              <a:t> != </a:t>
+            </a:r>
+            <a:r>
+              <a:rPr lang="en-US" dirty="0" err="1"/>
+              <a:t>boid</a:t>
+            </a:r>
+            <a:r>
+              <a:rPr lang="en-US" dirty="0"/>
+              <a:t>) {</a:t>
+            </a:r>
+            <a:br>
+              <a:rPr lang="en-US" dirty="0"/>
+            </a:br>
+            <a:r>
+              <a:rPr lang="en-US" dirty="0"/>
+              <a:t>			if (</a:t>
+            </a:r>
+            <a:r>
+              <a:rPr lang="en-US" dirty="0" err="1"/>
+              <a:t>IsNeighbor</a:t>
+            </a:r>
+            <a:r>
+              <a:rPr lang="en-US" dirty="0"/>
+              <a:t>(</a:t>
+            </a:r>
+            <a:r>
+              <a:rPr lang="en-US" dirty="0" err="1"/>
+              <a:t>currentBoid</a:t>
+            </a:r>
+            <a:r>
+              <a:rPr lang="en-US" dirty="0"/>
+              <a:t>, </a:t>
+            </a:r>
+            <a:r>
+              <a:rPr lang="en-US" dirty="0" err="1"/>
+              <a:t>boid</a:t>
+            </a:r>
+            <a:r>
+              <a:rPr lang="en-US" dirty="0"/>
+              <a:t>)) {</a:t>
+            </a:r>
+            <a:br>
+              <a:rPr lang="en-US" dirty="0"/>
+            </a:br>
+            <a:r>
+              <a:rPr lang="en-US" dirty="0"/>
+              <a:t>				separation += (</a:t>
+            </a:r>
+            <a:r>
+              <a:rPr lang="en-US" dirty="0" err="1"/>
+              <a:t>boid.position</a:t>
+            </a:r>
+            <a:r>
+              <a:rPr lang="en-US" dirty="0"/>
+              <a:t>  - </a:t>
+            </a:r>
+            <a:r>
+              <a:rPr lang="en-US" dirty="0" err="1"/>
+              <a:t>currentBoid.position</a:t>
+            </a:r>
+            <a:r>
+              <a:rPr lang="en-US" dirty="0"/>
+              <a:t>);</a:t>
+            </a:r>
+            <a:br>
+              <a:rPr lang="en-US" dirty="0"/>
+            </a:br>
+            <a:r>
+              <a:rPr lang="en-US" dirty="0"/>
+              <a:t>				</a:t>
+            </a:r>
+            <a:r>
+              <a:rPr lang="en-US" dirty="0" err="1"/>
+              <a:t>neighborCount</a:t>
+            </a:r>
+            <a:r>
+              <a:rPr lang="en-US" dirty="0"/>
+              <a:t>++;</a:t>
+            </a:r>
+            <a:br>
+              <a:rPr lang="en-US" dirty="0"/>
+            </a:br>
+            <a:r>
+              <a:rPr lang="en-US" dirty="0"/>
+              <a:t>			}</a:t>
+            </a:r>
+            <a:br>
+              <a:rPr lang="en-US" dirty="0"/>
+            </a:br>
+            <a:r>
+              <a:rPr lang="en-US" dirty="0"/>
+              <a:t>		}</a:t>
+            </a:r>
+            <a:br>
+              <a:rPr lang="en-US" dirty="0"/>
+            </a:br>
+            <a:r>
+              <a:rPr lang="en-US" dirty="0"/>
+              <a:t>		return ((separation / </a:t>
+            </a:r>
+            <a:r>
+              <a:rPr lang="en-US" dirty="0" err="1"/>
+              <a:t>neighborCount</a:t>
+            </a:r>
+            <a:r>
+              <a:rPr lang="en-US" dirty="0"/>
+              <a:t>) * -1).normalized;</a:t>
+            </a:r>
+            <a:br>
+              <a:rPr lang="en-US" dirty="0"/>
+            </a:br>
+            <a:r>
+              <a:rPr lang="en-US" dirty="0"/>
+              <a:t>}</a:t>
+            </a:r>
+          </a:p>
+        </p:txBody>
+      </p:sp>
+    </p:spTree>
+    <p:extLst>
+      <p:ext uri="{BB962C8B-B14F-4D97-AF65-F5344CB8AC3E}">
+        <p14:creationId xmlns:p14="http://schemas.microsoft.com/office/powerpoint/2010/main" val="820855311"/>
       </p:ext>
     </p:extLst>
   </p:cSld>

</xml_diff>

<commit_message>
Updates the read me.
</commit_message>
<xml_diff>
--- a/Flocking.pptx
+++ b/Flocking.pptx
@@ -18,6 +18,7 @@
     <p:sldId id="266" r:id="rId12"/>
     <p:sldId id="267" r:id="rId13"/>
     <p:sldId id="268" r:id="rId14"/>
+    <p:sldId id="269" r:id="rId15"/>
   </p:sldIdLst>
   <p:sldSz cx="12192000" cy="6858000"/>
   <p:notesSz cx="6858000" cy="9144000"/>
@@ -134,6 +135,7 @@
             <p14:sldId id="266"/>
             <p14:sldId id="267"/>
             <p14:sldId id="268"/>
+            <p14:sldId id="269"/>
           </p14:sldIdLst>
         </p14:section>
       </p14:sectionLst>
@@ -244,7 +246,7 @@
           <a:effectLst/>
           <a:extLst>
             <a:ext uri="{91240B29-F687-4f45-9708-019B960494DF}">
-              <a14:hiddenLine xmlns="" xmlns:a14="http://schemas.microsoft.com/office/drawing/2010/main" w="9525">
+              <a14:hiddenLine xmlns:a14="http://schemas.microsoft.com/office/drawing/2010/main" xmlns="" w="9525">
                 <a:solidFill>
                   <a:srgbClr val="000000"/>
                 </a:solidFill>
@@ -437,7 +439,7 @@
             <a:fld id="{08B9EBBA-996F-894A-B54A-D6246ED52CEA}" type="datetimeFigureOut">
               <a:rPr lang="en-US" smtClean="0"/>
               <a:pPr/>
-              <a:t>5/18/2017</a:t>
+              <a:t>5/19/2017</a:t>
             </a:fld>
             <a:endParaRPr lang="en-US" dirty="0"/>
           </a:p>
@@ -757,7 +759,7 @@
             <a:fld id="{18C79C5D-2A6F-F04D-97DA-BEF2467B64E4}" type="datetimeFigureOut">
               <a:rPr lang="en-US" smtClean="0"/>
               <a:pPr/>
-              <a:t>5/18/2017</a:t>
+              <a:t>5/19/2017</a:t>
             </a:fld>
             <a:endParaRPr lang="en-US" dirty="0"/>
           </a:p>
@@ -1247,7 +1249,7 @@
             <a:fld id="{8DFA1846-DA80-1C48-A609-854EA85C59AD}" type="datetimeFigureOut">
               <a:rPr lang="en-US" smtClean="0"/>
               <a:pPr/>
-              <a:t>5/18/2017</a:t>
+              <a:t>5/19/2017</a:t>
             </a:fld>
             <a:endParaRPr lang="en-US" dirty="0"/>
           </a:p>
@@ -1618,7 +1620,7 @@
             <a:fld id="{FBF54567-0DE4-3F47-BF90-CB84690072F9}" type="datetimeFigureOut">
               <a:rPr lang="en-US" smtClean="0"/>
               <a:pPr/>
-              <a:t>5/18/2017</a:t>
+              <a:t>5/19/2017</a:t>
             </a:fld>
             <a:endParaRPr lang="en-US" dirty="0"/>
           </a:p>
@@ -1774,7 +1776,7 @@
           <a:ln/>
           <a:extLst>
             <a:ext uri="{91240B29-F687-4f45-9708-019B960494DF}">
-              <a14:hiddenLine xmlns="" xmlns:a14="http://schemas.microsoft.com/office/drawing/2010/main" w="9525">
+              <a14:hiddenLine xmlns:a14="http://schemas.microsoft.com/office/drawing/2010/main" xmlns="" w="9525">
                 <a:solidFill>
                   <a:srgbClr val="000000"/>
                 </a:solidFill>
@@ -1893,7 +1895,7 @@
             <a:fld id="{C6C52C72-DE31-F449-A4ED-4C594FD91407}" type="datetimeFigureOut">
               <a:rPr lang="en-US" smtClean="0"/>
               <a:pPr/>
-              <a:t>5/18/2017</a:t>
+              <a:t>5/19/2017</a:t>
             </a:fld>
             <a:endParaRPr lang="en-US" dirty="0"/>
           </a:p>
@@ -2051,7 +2053,7 @@
           <a:ln/>
           <a:extLst>
             <a:ext uri="{91240B29-F687-4f45-9708-019B960494DF}">
-              <a14:hiddenLine xmlns="" xmlns:a14="http://schemas.microsoft.com/office/drawing/2010/main" w="9525">
+              <a14:hiddenLine xmlns:a14="http://schemas.microsoft.com/office/drawing/2010/main" xmlns="" w="9525">
                 <a:solidFill>
                   <a:srgbClr val="000000"/>
                 </a:solidFill>
@@ -2180,7 +2182,7 @@
             <a:fld id="{ED62726E-379B-B349-9EED-81ED093FA806}" type="datetimeFigureOut">
               <a:rPr lang="en-US" smtClean="0"/>
               <a:pPr/>
-              <a:t>5/18/2017</a:t>
+              <a:t>5/19/2017</a:t>
             </a:fld>
             <a:endParaRPr lang="en-US" dirty="0"/>
           </a:p>
@@ -2336,7 +2338,7 @@
           <a:ln/>
           <a:extLst>
             <a:ext uri="{91240B29-F687-4f45-9708-019B960494DF}">
-              <a14:hiddenLine xmlns="" xmlns:a14="http://schemas.microsoft.com/office/drawing/2010/main" w="9525">
+              <a14:hiddenLine xmlns:a14="http://schemas.microsoft.com/office/drawing/2010/main" xmlns="" w="9525">
                 <a:solidFill>
                   <a:srgbClr val="000000"/>
                 </a:solidFill>
@@ -2465,7 +2467,7 @@
             <a:fld id="{9B3A1323-8D79-1946-B0D7-40001CF92E9D}" type="datetimeFigureOut">
               <a:rPr lang="en-US" smtClean="0"/>
               <a:pPr/>
-              <a:t>5/18/2017</a:t>
+              <a:t>5/19/2017</a:t>
             </a:fld>
             <a:endParaRPr lang="en-US" dirty="0"/>
           </a:p>
@@ -2810,7 +2812,7 @@
             <a:fld id="{8DFA1846-DA80-1C48-A609-854EA85C59AD}" type="datetimeFigureOut">
               <a:rPr lang="en-US" smtClean="0"/>
               <a:pPr/>
-              <a:t>5/18/2017</a:t>
+              <a:t>5/19/2017</a:t>
             </a:fld>
             <a:endParaRPr lang="en-US" dirty="0"/>
           </a:p>
@@ -2966,7 +2968,7 @@
           <a:ln/>
           <a:extLst>
             <a:ext uri="{91240B29-F687-4f45-9708-019B960494DF}">
-              <a14:hiddenLine xmlns="" xmlns:a14="http://schemas.microsoft.com/office/drawing/2010/main" w="9525">
+              <a14:hiddenLine xmlns:a14="http://schemas.microsoft.com/office/drawing/2010/main" xmlns="" w="9525">
                 <a:solidFill>
                   <a:srgbClr val="000000"/>
                 </a:solidFill>
@@ -3151,7 +3153,7 @@
             <a:fld id="{57302355-E14B-8545-A8F8-0FE83CC9D524}" type="datetimeFigureOut">
               <a:rPr lang="en-US" smtClean="0"/>
               <a:pPr/>
-              <a:t>5/18/2017</a:t>
+              <a:t>5/19/2017</a:t>
             </a:fld>
             <a:endParaRPr lang="en-US" dirty="0"/>
           </a:p>
@@ -3307,7 +3309,7 @@
           <a:ln/>
           <a:extLst>
             <a:ext uri="{91240B29-F687-4f45-9708-019B960494DF}">
-              <a14:hiddenLine xmlns="" xmlns:a14="http://schemas.microsoft.com/office/drawing/2010/main" w="9525">
+              <a14:hiddenLine xmlns:a14="http://schemas.microsoft.com/office/drawing/2010/main" xmlns="" w="9525">
                 <a:solidFill>
                   <a:srgbClr val="000000"/>
                 </a:solidFill>
@@ -3630,7 +3632,7 @@
             <a:fld id="{02640F58-564D-2B4F-AE67-E407BA4FCF45}" type="datetimeFigureOut">
               <a:rPr lang="en-US" smtClean="0"/>
               <a:pPr/>
-              <a:t>5/18/2017</a:t>
+              <a:t>5/19/2017</a:t>
             </a:fld>
             <a:endParaRPr lang="en-US" dirty="0"/>
           </a:p>
@@ -3786,7 +3788,7 @@
           <a:ln/>
           <a:extLst>
             <a:ext uri="{91240B29-F687-4f45-9708-019B960494DF}">
-              <a14:hiddenLine xmlns="" xmlns:a14="http://schemas.microsoft.com/office/drawing/2010/main" w="9525">
+              <a14:hiddenLine xmlns:a14="http://schemas.microsoft.com/office/drawing/2010/main" xmlns="" w="9525">
                 <a:solidFill>
                   <a:srgbClr val="000000"/>
                 </a:solidFill>
@@ -3853,7 +3855,7 @@
             <a:fld id="{F13A34C8-038E-2045-AF43-DF7DBB8E0E9E}" type="datetimeFigureOut">
               <a:rPr lang="en-US" smtClean="0"/>
               <a:pPr/>
-              <a:t>5/18/2017</a:t>
+              <a:t>5/19/2017</a:t>
             </a:fld>
             <a:endParaRPr lang="en-US" dirty="0"/>
           </a:p>
@@ -3950,7 +3952,7 @@
             <a:fld id="{8818C68F-D26B-8F47-958C-23B49CF8A634}" type="datetimeFigureOut">
               <a:rPr lang="en-US" smtClean="0"/>
               <a:pPr/>
-              <a:t>5/18/2017</a:t>
+              <a:t>5/19/2017</a:t>
             </a:fld>
             <a:endParaRPr lang="en-US" dirty="0"/>
           </a:p>
@@ -4219,7 +4221,7 @@
           <a:ln/>
           <a:extLst>
             <a:ext uri="{91240B29-F687-4f45-9708-019B960494DF}">
-              <a14:hiddenLine xmlns="" xmlns:a14="http://schemas.microsoft.com/office/drawing/2010/main" w="9525">
+              <a14:hiddenLine xmlns:a14="http://schemas.microsoft.com/office/drawing/2010/main" xmlns="" w="9525">
                 <a:solidFill>
                   <a:srgbClr val="000000"/>
                 </a:solidFill>
@@ -4419,7 +4421,7 @@
             <a:fld id="{D0DF5E60-9974-AC48-9591-99C2BB44B7CF}" type="datetimeFigureOut">
               <a:rPr lang="en-US" smtClean="0"/>
               <a:pPr/>
-              <a:t>5/18/2017</a:t>
+              <a:t>5/19/2017</a:t>
             </a:fld>
             <a:endParaRPr lang="en-US" dirty="0"/>
           </a:p>
@@ -4734,7 +4736,7 @@
             <a:fld id="{18C79C5D-2A6F-F04D-97DA-BEF2467B64E4}" type="datetimeFigureOut">
               <a:rPr lang="en-US" smtClean="0"/>
               <a:pPr/>
-              <a:t>5/18/2017</a:t>
+              <a:t>5/19/2017</a:t>
             </a:fld>
             <a:endParaRPr lang="en-US" dirty="0"/>
           </a:p>
@@ -5006,7 +5008,7 @@
             <a:fld id="{09B482E8-6E0E-1B4F-B1FD-C69DB9E858D9}" type="datetimeFigureOut">
               <a:rPr lang="en-US" smtClean="0"/>
               <a:pPr/>
-              <a:t>5/18/2017</a:t>
+              <a:t>5/19/2017</a:t>
             </a:fld>
             <a:endParaRPr lang="en-US" dirty="0"/>
           </a:p>
@@ -5914,6 +5916,88 @@
 </p:sld>
 </file>
 
+<file path=ppt/slides/slide14.xml><?xml version="1.0" encoding="utf-8"?>
+<p:sld xmlns:a="http://schemas.openxmlformats.org/drawingml/2006/main" xmlns:r="http://schemas.openxmlformats.org/officeDocument/2006/relationships" xmlns:p="http://schemas.openxmlformats.org/presentationml/2006/main">
+  <p:cSld>
+    <p:spTree>
+      <p:nvGrpSpPr>
+        <p:cNvPr id="1" name=""/>
+        <p:cNvGrpSpPr/>
+        <p:nvPr/>
+      </p:nvGrpSpPr>
+      <p:grpSpPr>
+        <a:xfrm>
+          <a:off x="0" y="0"/>
+          <a:ext cx="0" cy="0"/>
+          <a:chOff x="0" y="0"/>
+          <a:chExt cx="0" cy="0"/>
+        </a:xfrm>
+      </p:grpSpPr>
+      <p:sp>
+        <p:nvSpPr>
+          <p:cNvPr id="2" name="Title 1"/>
+          <p:cNvSpPr>
+            <a:spLocks noGrp="1"/>
+          </p:cNvSpPr>
+          <p:nvPr>
+            <p:ph type="title"/>
+          </p:nvPr>
+        </p:nvSpPr>
+        <p:spPr/>
+        <p:txBody>
+          <a:bodyPr/>
+          <a:lstStyle/>
+          <a:p>
+            <a:r>
+              <a:rPr lang="en-US" dirty="0"/>
+              <a:t>Github Link for Source Code </a:t>
+            </a:r>
+            <a:r>
+              <a:rPr lang="en-US"/>
+              <a:t>and Demo</a:t>
+            </a:r>
+            <a:endParaRPr lang="en-US" dirty="0"/>
+          </a:p>
+        </p:txBody>
+      </p:sp>
+      <p:sp>
+        <p:nvSpPr>
+          <p:cNvPr id="4" name="Content Placeholder 3"/>
+          <p:cNvSpPr>
+            <a:spLocks noGrp="1"/>
+          </p:cNvSpPr>
+          <p:nvPr>
+            <p:ph idx="1"/>
+          </p:nvPr>
+        </p:nvSpPr>
+        <p:spPr/>
+        <p:txBody>
+          <a:bodyPr/>
+          <a:lstStyle/>
+          <a:p>
+            <a:r>
+              <a:rPr lang="en-US" dirty="0">
+                <a:hlinkClick r:id="rId2"/>
+              </a:rPr>
+              <a:t>https://github.com/psuong/boids-controller</a:t>
+            </a:r>
+            <a:endParaRPr lang="en-US" dirty="0"/>
+          </a:p>
+        </p:txBody>
+      </p:sp>
+    </p:spTree>
+    <p:extLst>
+      <p:ext uri="{BB962C8B-B14F-4D97-AF65-F5344CB8AC3E}">
+        <p14:creationId xmlns:p14="http://schemas.microsoft.com/office/powerpoint/2010/main" val="699297155"/>
+      </p:ext>
+    </p:extLst>
+  </p:cSld>
+  <p:clrMapOvr>
+    <a:masterClrMapping/>
+  </p:clrMapOvr>
+</p:sld>
+</file>
+
 <file path=ppt/slides/slide2.xml><?xml version="1.0" encoding="utf-8"?>
 <p:sld xmlns:a="http://schemas.openxmlformats.org/drawingml/2006/main" xmlns:r="http://schemas.openxmlformats.org/officeDocument/2006/relationships" xmlns:p="http://schemas.openxmlformats.org/presentationml/2006/main">
   <p:cSld>

</xml_diff>